<commit_message>
update files for class today
</commit_message>
<xml_diff>
--- a/1. Intro to R/presentations/2. R-Intro_part2_2021.pptx
+++ b/1. Intro to R/presentations/2. R-Intro_part2_2021.pptx
@@ -5,33 +5,21 @@
     <p:sldMasterId id="2147483660" r:id="rId1"/>
   </p:sldMasterIdLst>
   <p:notesMasterIdLst>
-    <p:notesMasterId r:id="rId26"/>
+    <p:notesMasterId r:id="rId14"/>
   </p:notesMasterIdLst>
   <p:sldIdLst>
     <p:sldId id="256" r:id="rId2"/>
     <p:sldId id="265" r:id="rId3"/>
-    <p:sldId id="262" r:id="rId4"/>
-    <p:sldId id="263" r:id="rId5"/>
-    <p:sldId id="257" r:id="rId6"/>
-    <p:sldId id="258" r:id="rId7"/>
-    <p:sldId id="259" r:id="rId8"/>
-    <p:sldId id="288" r:id="rId9"/>
-    <p:sldId id="268" r:id="rId10"/>
-    <p:sldId id="269" r:id="rId11"/>
-    <p:sldId id="270" r:id="rId12"/>
-    <p:sldId id="271" r:id="rId13"/>
-    <p:sldId id="272" r:id="rId14"/>
-    <p:sldId id="300" r:id="rId15"/>
-    <p:sldId id="273" r:id="rId16"/>
-    <p:sldId id="299" r:id="rId17"/>
-    <p:sldId id="274" r:id="rId18"/>
-    <p:sldId id="301" r:id="rId19"/>
-    <p:sldId id="302" r:id="rId20"/>
-    <p:sldId id="303" r:id="rId21"/>
-    <p:sldId id="304" r:id="rId22"/>
-    <p:sldId id="305" r:id="rId23"/>
-    <p:sldId id="296" r:id="rId24"/>
-    <p:sldId id="260" r:id="rId25"/>
+    <p:sldId id="300" r:id="rId4"/>
+    <p:sldId id="273" r:id="rId5"/>
+    <p:sldId id="274" r:id="rId6"/>
+    <p:sldId id="285" r:id="rId7"/>
+    <p:sldId id="299" r:id="rId8"/>
+    <p:sldId id="286" r:id="rId9"/>
+    <p:sldId id="301" r:id="rId10"/>
+    <p:sldId id="310" r:id="rId11"/>
+    <p:sldId id="302" r:id="rId12"/>
+    <p:sldId id="303" r:id="rId13"/>
   </p:sldIdLst>
   <p:sldSz cx="9144000" cy="6858000" type="screen4x3"/>
   <p:notesSz cx="6858000" cy="9144000"/>
@@ -485,293 +473,6 @@
     </a:lvl9pPr>
   </p:notesStyle>
 </p:notesMaster>
-</file>
-
-<file path=ppt/notesSlides/notesSlide1.xml><?xml version="1.0" encoding="utf-8"?>
-<p:notes xmlns:a="http://schemas.openxmlformats.org/drawingml/2006/main" xmlns:r="http://schemas.openxmlformats.org/officeDocument/2006/relationships" xmlns:p="http://schemas.openxmlformats.org/presentationml/2006/main">
-  <p:cSld>
-    <p:spTree>
-      <p:nvGrpSpPr>
-        <p:cNvPr id="1" name=""/>
-        <p:cNvGrpSpPr/>
-        <p:nvPr/>
-      </p:nvGrpSpPr>
-      <p:grpSpPr>
-        <a:xfrm>
-          <a:off x="0" y="0"/>
-          <a:ext cx="0" cy="0"/>
-          <a:chOff x="0" y="0"/>
-          <a:chExt cx="0" cy="0"/>
-        </a:xfrm>
-      </p:grpSpPr>
-      <p:sp>
-        <p:nvSpPr>
-          <p:cNvPr id="2" name="Slide Image Placeholder 1"/>
-          <p:cNvSpPr>
-            <a:spLocks noGrp="1" noRot="1" noChangeAspect="1"/>
-          </p:cNvSpPr>
-          <p:nvPr>
-            <p:ph type="sldImg"/>
-          </p:nvPr>
-        </p:nvSpPr>
-        <p:spPr/>
-      </p:sp>
-      <p:sp>
-        <p:nvSpPr>
-          <p:cNvPr id="3" name="Notes Placeholder 2"/>
-          <p:cNvSpPr>
-            <a:spLocks noGrp="1"/>
-          </p:cNvSpPr>
-          <p:nvPr>
-            <p:ph type="body" idx="1"/>
-          </p:nvPr>
-        </p:nvSpPr>
-        <p:spPr/>
-        <p:txBody>
-          <a:bodyPr/>
-          <a:lstStyle/>
-          <a:p>
-            <a:endParaRPr lang="en-US" dirty="0"/>
-          </a:p>
-        </p:txBody>
-      </p:sp>
-      <p:sp>
-        <p:nvSpPr>
-          <p:cNvPr id="4" name="Slide Number Placeholder 3"/>
-          <p:cNvSpPr>
-            <a:spLocks noGrp="1"/>
-          </p:cNvSpPr>
-          <p:nvPr>
-            <p:ph type="sldNum" sz="quarter" idx="10"/>
-          </p:nvPr>
-        </p:nvSpPr>
-        <p:spPr/>
-        <p:txBody>
-          <a:bodyPr/>
-          <a:lstStyle/>
-          <a:p>
-            <a:fld id="{62F97255-B693-B54F-97EA-E621787727F9}" type="slidenum">
-              <a:rPr lang="en-US" smtClean="0"/>
-              <a:t>12</a:t>
-            </a:fld>
-            <a:endParaRPr lang="en-US"/>
-          </a:p>
-        </p:txBody>
-      </p:sp>
-    </p:spTree>
-    <p:extLst>
-      <p:ext uri="{BB962C8B-B14F-4D97-AF65-F5344CB8AC3E}">
-        <p14:creationId xmlns:p14="http://schemas.microsoft.com/office/powerpoint/2010/main" val="825082894"/>
-      </p:ext>
-    </p:extLst>
-  </p:cSld>
-  <p:clrMapOvr>
-    <a:masterClrMapping/>
-  </p:clrMapOvr>
-</p:notes>
-</file>
-
-<file path=ppt/notesSlides/notesSlide2.xml><?xml version="1.0" encoding="utf-8"?>
-<p:notes xmlns:a="http://schemas.openxmlformats.org/drawingml/2006/main" xmlns:r="http://schemas.openxmlformats.org/officeDocument/2006/relationships" xmlns:p="http://schemas.openxmlformats.org/presentationml/2006/main">
-  <p:cSld>
-    <p:spTree>
-      <p:nvGrpSpPr>
-        <p:cNvPr id="1" name=""/>
-        <p:cNvGrpSpPr/>
-        <p:nvPr/>
-      </p:nvGrpSpPr>
-      <p:grpSpPr>
-        <a:xfrm>
-          <a:off x="0" y="0"/>
-          <a:ext cx="0" cy="0"/>
-          <a:chOff x="0" y="0"/>
-          <a:chExt cx="0" cy="0"/>
-        </a:xfrm>
-      </p:grpSpPr>
-      <p:sp>
-        <p:nvSpPr>
-          <p:cNvPr id="2" name="Slide Image Placeholder 1"/>
-          <p:cNvSpPr>
-            <a:spLocks noGrp="1" noRot="1" noChangeAspect="1"/>
-          </p:cNvSpPr>
-          <p:nvPr>
-            <p:ph type="sldImg"/>
-          </p:nvPr>
-        </p:nvSpPr>
-        <p:spPr/>
-      </p:sp>
-      <p:sp>
-        <p:nvSpPr>
-          <p:cNvPr id="3" name="Notes Placeholder 2"/>
-          <p:cNvSpPr>
-            <a:spLocks noGrp="1"/>
-          </p:cNvSpPr>
-          <p:nvPr>
-            <p:ph type="body" idx="1"/>
-          </p:nvPr>
-        </p:nvSpPr>
-        <p:spPr/>
-        <p:txBody>
-          <a:bodyPr>
-            <a:normAutofit/>
-          </a:bodyPr>
-          <a:lstStyle/>
-          <a:p>
-            <a:r>
-              <a:rPr lang="en-US" dirty="0"/>
-              <a:t>Header=T means first row contains variable names</a:t>
-            </a:r>
-          </a:p>
-        </p:txBody>
-      </p:sp>
-      <p:sp>
-        <p:nvSpPr>
-          <p:cNvPr id="4" name="Slide Number Placeholder 3"/>
-          <p:cNvSpPr>
-            <a:spLocks noGrp="1"/>
-          </p:cNvSpPr>
-          <p:nvPr>
-            <p:ph type="sldNum" sz="quarter" idx="10"/>
-          </p:nvPr>
-        </p:nvSpPr>
-        <p:spPr/>
-        <p:txBody>
-          <a:bodyPr/>
-          <a:lstStyle/>
-          <a:p>
-            <a:fld id="{C95BFFDA-D938-4C0F-A2A8-5BB6B5B11556}" type="slidenum">
-              <a:rPr lang="en-US" smtClean="0"/>
-              <a:pPr/>
-              <a:t>22</a:t>
-            </a:fld>
-            <a:endParaRPr lang="en-US"/>
-          </a:p>
-        </p:txBody>
-      </p:sp>
-    </p:spTree>
-    <p:extLst>
-      <p:ext uri="{BB962C8B-B14F-4D97-AF65-F5344CB8AC3E}">
-        <p14:creationId xmlns:p14="http://schemas.microsoft.com/office/powerpoint/2010/main" val="2651360747"/>
-      </p:ext>
-    </p:extLst>
-  </p:cSld>
-  <p:clrMapOvr>
-    <a:masterClrMapping/>
-  </p:clrMapOvr>
-</p:notes>
-</file>
-
-<file path=ppt/notesSlides/notesSlide3.xml><?xml version="1.0" encoding="utf-8"?>
-<p:notes xmlns:a="http://schemas.openxmlformats.org/drawingml/2006/main" xmlns:r="http://schemas.openxmlformats.org/officeDocument/2006/relationships" xmlns:p="http://schemas.openxmlformats.org/presentationml/2006/main">
-  <p:cSld>
-    <p:spTree>
-      <p:nvGrpSpPr>
-        <p:cNvPr id="1" name=""/>
-        <p:cNvGrpSpPr/>
-        <p:nvPr/>
-      </p:nvGrpSpPr>
-      <p:grpSpPr>
-        <a:xfrm>
-          <a:off x="0" y="0"/>
-          <a:ext cx="0" cy="0"/>
-          <a:chOff x="0" y="0"/>
-          <a:chExt cx="0" cy="0"/>
-        </a:xfrm>
-      </p:grpSpPr>
-      <p:sp>
-        <p:nvSpPr>
-          <p:cNvPr id="2" name="Slide Image Placeholder 1"/>
-          <p:cNvSpPr>
-            <a:spLocks noGrp="1" noRot="1" noChangeAspect="1"/>
-          </p:cNvSpPr>
-          <p:nvPr>
-            <p:ph type="sldImg"/>
-          </p:nvPr>
-        </p:nvSpPr>
-        <p:spPr/>
-      </p:sp>
-      <p:sp>
-        <p:nvSpPr>
-          <p:cNvPr id="3" name="Notes Placeholder 2"/>
-          <p:cNvSpPr>
-            <a:spLocks noGrp="1"/>
-          </p:cNvSpPr>
-          <p:nvPr>
-            <p:ph type="body" idx="1"/>
-          </p:nvPr>
-        </p:nvSpPr>
-        <p:spPr/>
-        <p:txBody>
-          <a:bodyPr>
-            <a:normAutofit/>
-          </a:bodyPr>
-          <a:lstStyle/>
-          <a:p>
-            <a:r>
-              <a:rPr lang="en-US" dirty="0"/>
-              <a:t>Some numbers are actually factors-</a:t>
-            </a:r>
-            <a:r>
-              <a:rPr lang="en-US" baseline="0" dirty="0"/>
-              <a:t> think of 0/1 for dead/alive or </a:t>
-            </a:r>
-            <a:r>
-              <a:rPr lang="en-US" baseline="0" dirty="0" err="1"/>
-              <a:t>zipcodes</a:t>
-            </a:r>
-            <a:r>
-              <a:rPr lang="en-US" baseline="0" dirty="0"/>
-              <a:t> (average </a:t>
-            </a:r>
-            <a:r>
-              <a:rPr lang="en-US" baseline="0" dirty="0" err="1"/>
-              <a:t>zipcode</a:t>
-            </a:r>
-            <a:r>
-              <a:rPr lang="en-US" baseline="0" dirty="0"/>
-              <a:t>?)</a:t>
-            </a:r>
-          </a:p>
-          <a:p>
-            <a:endParaRPr lang="en-US" dirty="0"/>
-          </a:p>
-        </p:txBody>
-      </p:sp>
-      <p:sp>
-        <p:nvSpPr>
-          <p:cNvPr id="4" name="Slide Number Placeholder 3"/>
-          <p:cNvSpPr>
-            <a:spLocks noGrp="1"/>
-          </p:cNvSpPr>
-          <p:nvPr>
-            <p:ph type="sldNum" sz="quarter" idx="10"/>
-          </p:nvPr>
-        </p:nvSpPr>
-        <p:spPr/>
-        <p:txBody>
-          <a:bodyPr/>
-          <a:lstStyle/>
-          <a:p>
-            <a:fld id="{C95BFFDA-D938-4C0F-A2A8-5BB6B5B11556}" type="slidenum">
-              <a:rPr lang="en-US" smtClean="0"/>
-              <a:pPr/>
-              <a:t>24</a:t>
-            </a:fld>
-            <a:endParaRPr lang="en-US"/>
-          </a:p>
-        </p:txBody>
-      </p:sp>
-    </p:spTree>
-    <p:extLst>
-      <p:ext uri="{BB962C8B-B14F-4D97-AF65-F5344CB8AC3E}">
-        <p14:creationId xmlns:p14="http://schemas.microsoft.com/office/powerpoint/2010/main" val="940815122"/>
-      </p:ext>
-    </p:extLst>
-  </p:cSld>
-  <p:clrMapOvr>
-    <a:masterClrMapping/>
-  </p:clrMapOvr>
-</p:notes>
 </file>
 
 <file path=ppt/slideLayouts/slideLayout1.xml><?xml version="1.0" encoding="utf-8"?>
@@ -3733,7 +3434,13 @@
       </p:grpSpPr>
       <p:sp>
         <p:nvSpPr>
-          <p:cNvPr id="2" name="Title 1"/>
+          <p:cNvPr id="2" name="Title 1">
+            <a:extLst>
+              <a:ext uri="{FF2B5EF4-FFF2-40B4-BE49-F238E27FC236}">
+                <a16:creationId xmlns:a16="http://schemas.microsoft.com/office/drawing/2014/main" id="{0626D1B2-13EA-0448-B987-9F17E70FCA2D}"/>
+              </a:ext>
+            </a:extLst>
+          </p:cNvPr>
           <p:cNvSpPr>
             <a:spLocks noGrp="1"/>
           </p:cNvSpPr>
@@ -3743,21 +3450,25 @@
         </p:nvSpPr>
         <p:spPr/>
         <p:txBody>
-          <a:bodyPr>
-            <a:normAutofit/>
-          </a:bodyPr>
-          <a:lstStyle/>
-          <a:p>
-            <a:r>
-              <a:rPr lang="en-US" dirty="0"/>
-              <a:t>Which of these filenames are good/bad? Why?</a:t>
-            </a:r>
-          </a:p>
-        </p:txBody>
-      </p:sp>
-      <p:sp>
-        <p:nvSpPr>
-          <p:cNvPr id="3" name="Content Placeholder 2"/>
+          <a:bodyPr/>
+          <a:lstStyle/>
+          <a:p>
+            <a:r>
+              <a:rPr lang="en-US" dirty="0"/>
+              <a:t>7. $ and  [ , ]</a:t>
+            </a:r>
+          </a:p>
+        </p:txBody>
+      </p:sp>
+      <p:sp>
+        <p:nvSpPr>
+          <p:cNvPr id="3" name="Content Placeholder 2">
+            <a:extLst>
+              <a:ext uri="{FF2B5EF4-FFF2-40B4-BE49-F238E27FC236}">
+                <a16:creationId xmlns:a16="http://schemas.microsoft.com/office/drawing/2014/main" id="{CF836581-09D0-3540-8336-AA048D1A1AFE}"/>
+              </a:ext>
+            </a:extLst>
+          </p:cNvPr>
           <p:cNvSpPr>
             <a:spLocks noGrp="1"/>
           </p:cNvSpPr>
@@ -3767,85 +3478,57 @@
         </p:nvSpPr>
         <p:spPr/>
         <p:txBody>
-          <a:bodyPr>
-            <a:normAutofit/>
-          </a:bodyPr>
-          <a:lstStyle/>
-          <a:p>
+          <a:bodyPr/>
+          <a:lstStyle/>
+          <a:p>
+            <a:pPr marL="57150" indent="0">
+              <a:buNone/>
+            </a:pPr>
+            <a:r>
+              <a:rPr lang="en-US" dirty="0"/>
+              <a:t>R uses the form </a:t>
+            </a:r>
+          </a:p>
+          <a:p>
+            <a:pPr lvl="1"/>
             <a:r>
               <a:rPr lang="en-US" dirty="0" err="1"/>
-              <a:t>Stuff.R</a:t>
-            </a:r>
-            <a:endParaRPr lang="en-US" dirty="0"/>
-          </a:p>
-          <a:p>
-            <a:r>
-              <a:rPr lang="en-US" dirty="0"/>
-              <a:t>Model1 experiment@site1.R</a:t>
-            </a:r>
-          </a:p>
-          <a:p>
+              <a:t>data$column</a:t>
+            </a:r>
+            <a:r>
+              <a:rPr lang="en-US" dirty="0"/>
+              <a:t> to describe columns</a:t>
+            </a:r>
+          </a:p>
+          <a:p>
+            <a:pPr lvl="1"/>
+            <a:r>
+              <a:rPr lang="en-US" dirty="0"/>
+              <a:t>data[</a:t>
+            </a:r>
             <a:r>
               <a:rPr lang="en-US" dirty="0" err="1"/>
-              <a:t>AdultGPS</a:t>
-            </a:r>
-            <a:r>
-              <a:rPr lang="en-US" dirty="0"/>
-              <a:t> </a:t>
+              <a:t>i,j</a:t>
+            </a:r>
+            <a:r>
+              <a:rPr lang="en-US" dirty="0"/>
+              <a:t>], where </a:t>
             </a:r>
             <a:r>
               <a:rPr lang="en-US" dirty="0" err="1"/>
-              <a:t>Munge.R</a:t>
-            </a:r>
-            <a:endParaRPr lang="en-US" dirty="0"/>
-          </a:p>
-          <a:p>
-            <a:r>
-              <a:rPr lang="en-US" dirty="0" err="1"/>
-              <a:t>Make_dataframes.R</a:t>
-            </a:r>
-            <a:endParaRPr lang="en-US" dirty="0"/>
-          </a:p>
-          <a:p>
-            <a:r>
-              <a:rPr lang="en-US" dirty="0"/>
-              <a:t>Merge </a:t>
-            </a:r>
-            <a:r>
-              <a:rPr lang="en-US" dirty="0" err="1"/>
-              <a:t>Code.R</a:t>
-            </a:r>
-            <a:endParaRPr lang="en-US" dirty="0"/>
-          </a:p>
-          <a:p>
-            <a:r>
-              <a:rPr lang="en-US" dirty="0" err="1"/>
-              <a:t>Munge.R</a:t>
-            </a:r>
-            <a:endParaRPr lang="en-US" dirty="0"/>
-          </a:p>
-          <a:p>
-            <a:r>
-              <a:rPr lang="en-US" dirty="0"/>
-              <a:t>RatPredation19Jul12_no_treat.R</a:t>
-            </a:r>
-          </a:p>
-          <a:p>
-            <a:r>
-              <a:rPr lang="en-US" dirty="0" err="1"/>
-              <a:t>LunchinatoR.R</a:t>
-            </a:r>
-            <a:endParaRPr lang="en-US" dirty="0"/>
-          </a:p>
-          <a:p>
-            <a:endParaRPr lang="en-US" dirty="0"/>
+              <a:t>i</a:t>
+            </a:r>
+            <a:r>
+              <a:rPr lang="en-US" dirty="0"/>
+              <a:t> is row, j is column to describe cells </a:t>
+            </a:r>
           </a:p>
         </p:txBody>
       </p:sp>
     </p:spTree>
     <p:extLst>
       <p:ext uri="{BB962C8B-B14F-4D97-AF65-F5344CB8AC3E}">
-        <p14:creationId xmlns:p14="http://schemas.microsoft.com/office/powerpoint/2010/main" val="2811347013"/>
+        <p14:creationId xmlns:p14="http://schemas.microsoft.com/office/powerpoint/2010/main" val="358357075"/>
       </p:ext>
     </p:extLst>
   </p:cSld>
@@ -3874,7 +3557,13 @@
       </p:grpSpPr>
       <p:sp>
         <p:nvSpPr>
-          <p:cNvPr id="2" name="Title 1"/>
+          <p:cNvPr id="2" name="Title 1">
+            <a:extLst>
+              <a:ext uri="{FF2B5EF4-FFF2-40B4-BE49-F238E27FC236}">
+                <a16:creationId xmlns:a16="http://schemas.microsoft.com/office/drawing/2014/main" id="{F0E3E0B7-F782-EE4E-85AD-71CDCC4B720C}"/>
+              </a:ext>
+            </a:extLst>
+          </p:cNvPr>
           <p:cNvSpPr>
             <a:spLocks noGrp="1"/>
           </p:cNvSpPr>
@@ -3889,66 +3578,100 @@
           <a:p>
             <a:r>
               <a:rPr lang="en-US" dirty="0"/>
-              <a:t>3. </a:t>
+              <a:t>8. Dealing with classes - Dates</a:t>
+            </a:r>
+          </a:p>
+        </p:txBody>
+      </p:sp>
+      <p:sp>
+        <p:nvSpPr>
+          <p:cNvPr id="3" name="Content Placeholder 2">
+            <a:extLst>
+              <a:ext uri="{FF2B5EF4-FFF2-40B4-BE49-F238E27FC236}">
+                <a16:creationId xmlns:a16="http://schemas.microsoft.com/office/drawing/2014/main" id="{E0C55E3F-E621-4C43-85F8-8A1BA0A85114}"/>
+              </a:ext>
+            </a:extLst>
+          </p:cNvPr>
+          <p:cNvSpPr>
+            <a:spLocks noGrp="1"/>
+          </p:cNvSpPr>
+          <p:nvPr>
+            <p:ph idx="1"/>
+          </p:nvPr>
+        </p:nvSpPr>
+        <p:spPr/>
+        <p:txBody>
+          <a:bodyPr/>
+          <a:lstStyle/>
+          <a:p>
+            <a:r>
+              <a:rPr lang="en-US" dirty="0"/>
+              <a:t>Class "</a:t>
             </a:r>
             <a:r>
               <a:rPr lang="en-US" dirty="0" err="1"/>
-              <a:t>Styleguide</a:t>
-            </a:r>
-            <a:r>
-              <a:rPr lang="en-US" dirty="0"/>
-              <a:t> – script structure</a:t>
-            </a:r>
-          </a:p>
-        </p:txBody>
-      </p:sp>
-      <p:sp>
-        <p:nvSpPr>
-          <p:cNvPr id="3" name="Content Placeholder 2"/>
-          <p:cNvSpPr>
-            <a:spLocks noGrp="1"/>
-          </p:cNvSpPr>
-          <p:nvPr>
-            <p:ph idx="1"/>
-          </p:nvPr>
-        </p:nvSpPr>
-        <p:spPr/>
-        <p:txBody>
-          <a:bodyPr>
-            <a:normAutofit/>
-          </a:bodyPr>
-          <a:lstStyle/>
-          <a:p>
-            <a:r>
-              <a:rPr lang="en-US" dirty="0"/>
-              <a:t>Start script with a title and description </a:t>
-            </a:r>
-          </a:p>
-          <a:p>
-            <a:r>
-              <a:rPr lang="en-US" dirty="0"/>
-              <a:t>Use commented lines to break up your file into easily readable chunks.</a:t>
-            </a:r>
-          </a:p>
-          <a:p>
-            <a:pPr lvl="1"/>
-            <a:r>
-              <a:rPr lang="en-US" dirty="0"/>
-              <a:t># Read in data -----------------------</a:t>
-            </a:r>
-          </a:p>
-          <a:p>
-            <a:r>
-              <a:rPr lang="en-US" dirty="0"/>
-              <a:t>If your script uses external packages (libraries), load them all at once at the very beginning of the file. </a:t>
-            </a:r>
+              <a:t>POSIXct</a:t>
+            </a:r>
+            <a:r>
+              <a:rPr lang="en-US" dirty="0"/>
+              <a:t>" represents the (signed) number of seconds since the beginning of 1970 (in the UTC time zone) as a numeric vector. </a:t>
+            </a:r>
+          </a:p>
+          <a:p>
+            <a:r>
+              <a:rPr lang="en-US" dirty="0"/>
+              <a:t>ISO8601 – international standard  with components organized biggest to smallest (year, month, day, hour, min, sec)</a:t>
+            </a:r>
+          </a:p>
+          <a:p>
+            <a:r>
+              <a:rPr lang="en-US" dirty="0" err="1"/>
+              <a:t>Lubridate</a:t>
+            </a:r>
+            <a:r>
+              <a:rPr lang="en-US" dirty="0"/>
+              <a:t> package (</a:t>
+            </a:r>
+            <a:r>
+              <a:rPr lang="en-US" dirty="0" err="1"/>
+              <a:t>tidyverse</a:t>
+            </a:r>
+            <a:r>
+              <a:rPr lang="en-US" dirty="0"/>
+              <a:t> but not part of core installation)</a:t>
+            </a:r>
+          </a:p>
+          <a:p>
+            <a:r>
+              <a:rPr lang="en-US" dirty="0"/>
+              <a:t>Use functions like ‘</a:t>
+            </a:r>
+            <a:r>
+              <a:rPr lang="en-US" dirty="0" err="1"/>
+              <a:t>ymd</a:t>
+            </a:r>
+            <a:r>
+              <a:rPr lang="en-US" dirty="0"/>
+              <a:t>’, ‘</a:t>
+            </a:r>
+            <a:r>
+              <a:rPr lang="en-US" dirty="0" err="1"/>
+              <a:t>dmy</a:t>
+            </a:r>
+            <a:r>
+              <a:rPr lang="en-US" dirty="0"/>
+              <a:t>’, </a:t>
+            </a:r>
+          </a:p>
+          <a:p>
+            <a:endParaRPr lang="en-US" dirty="0"/>
           </a:p>
         </p:txBody>
       </p:sp>
     </p:spTree>
     <p:extLst>
       <p:ext uri="{BB962C8B-B14F-4D97-AF65-F5344CB8AC3E}">
-        <p14:creationId xmlns:p14="http://schemas.microsoft.com/office/powerpoint/2010/main" val="398975198"/>
+        <p14:creationId xmlns:p14="http://schemas.microsoft.com/office/powerpoint/2010/main" val="1585831353"/>
       </p:ext>
     </p:extLst>
   </p:cSld>
@@ -3977,7 +3700,13 @@
       </p:grpSpPr>
       <p:sp>
         <p:nvSpPr>
-          <p:cNvPr id="2" name="Title 1"/>
+          <p:cNvPr id="2" name="Title 1">
+            <a:extLst>
+              <a:ext uri="{FF2B5EF4-FFF2-40B4-BE49-F238E27FC236}">
+                <a16:creationId xmlns:a16="http://schemas.microsoft.com/office/drawing/2014/main" id="{12E18977-9083-6F43-B6C5-4C70B958E7BC}"/>
+              </a:ext>
+            </a:extLst>
+          </p:cNvPr>
           <p:cNvSpPr>
             <a:spLocks noGrp="1"/>
           </p:cNvSpPr>
@@ -3990,24 +3719,19 @@
           <a:bodyPr/>
           <a:lstStyle/>
           <a:p>
-            <a:r>
-              <a:rPr lang="en-US" dirty="0"/>
-              <a:t>3. </a:t>
-            </a:r>
-            <a:r>
-              <a:rPr lang="en-US" dirty="0" err="1"/>
-              <a:t>Styleguide</a:t>
-            </a:r>
-            <a:r>
-              <a:rPr lang="en-US" dirty="0"/>
-              <a:t> - Syntax</a:t>
-            </a:r>
-          </a:p>
-        </p:txBody>
-      </p:sp>
-      <p:sp>
-        <p:nvSpPr>
-          <p:cNvPr id="3" name="Content Placeholder 2"/>
+            <a:endParaRPr lang="en-US"/>
+          </a:p>
+        </p:txBody>
+      </p:sp>
+      <p:sp>
+        <p:nvSpPr>
+          <p:cNvPr id="3" name="Content Placeholder 2">
+            <a:extLst>
+              <a:ext uri="{FF2B5EF4-FFF2-40B4-BE49-F238E27FC236}">
+                <a16:creationId xmlns:a16="http://schemas.microsoft.com/office/drawing/2014/main" id="{D3E51221-3EE7-7344-AE4F-D23806F8F69A}"/>
+              </a:ext>
+            </a:extLst>
+          </p:cNvPr>
           <p:cNvSpPr>
             <a:spLocks noGrp="1"/>
           </p:cNvSpPr>
@@ -4017,1180 +3741,17 @@
         </p:nvSpPr>
         <p:spPr/>
         <p:txBody>
-          <a:bodyPr>
-            <a:normAutofit/>
-          </a:bodyPr>
-          <a:lstStyle/>
-          <a:p>
-            <a:r>
-              <a:rPr lang="en-US" dirty="0"/>
-              <a:t>Variable and function names should use CamelCase or all lowercase</a:t>
-            </a:r>
-          </a:p>
-          <a:p>
-            <a:r>
-              <a:rPr lang="en-US" dirty="0"/>
-              <a:t>Use underscores (_) to separate words within a name</a:t>
-            </a:r>
-          </a:p>
-          <a:p>
-            <a:r>
-              <a:rPr lang="en-US" dirty="0"/>
-              <a:t>Variable names should be nouns and function names should be verbs </a:t>
-            </a:r>
-          </a:p>
-          <a:p>
-            <a:r>
-              <a:rPr lang="en-US" dirty="0"/>
-              <a:t>Be concise when naming</a:t>
-            </a:r>
-          </a:p>
-          <a:p>
-            <a:r>
-              <a:rPr lang="en-US" dirty="0"/>
-              <a:t>Avoid re-using names of common functions and variables</a:t>
-            </a:r>
+          <a:bodyPr/>
+          <a:lstStyle/>
+          <a:p>
+            <a:endParaRPr lang="en-US"/>
           </a:p>
         </p:txBody>
       </p:sp>
     </p:spTree>
     <p:extLst>
       <p:ext uri="{BB962C8B-B14F-4D97-AF65-F5344CB8AC3E}">
-        <p14:creationId xmlns:p14="http://schemas.microsoft.com/office/powerpoint/2010/main" val="150362671"/>
-      </p:ext>
-    </p:extLst>
-  </p:cSld>
-  <p:clrMapOvr>
-    <a:masterClrMapping/>
-  </p:clrMapOvr>
-</p:sld>
-</file>
-
-<file path=ppt/slides/slide13.xml><?xml version="1.0" encoding="utf-8"?>
-<p:sld xmlns:a="http://schemas.openxmlformats.org/drawingml/2006/main" xmlns:r="http://schemas.openxmlformats.org/officeDocument/2006/relationships" xmlns:p="http://schemas.openxmlformats.org/presentationml/2006/main">
-  <p:cSld>
-    <p:spTree>
-      <p:nvGrpSpPr>
-        <p:cNvPr id="1" name=""/>
-        <p:cNvGrpSpPr/>
-        <p:nvPr/>
-      </p:nvGrpSpPr>
-      <p:grpSpPr>
-        <a:xfrm>
-          <a:off x="0" y="0"/>
-          <a:ext cx="0" cy="0"/>
-          <a:chOff x="0" y="0"/>
-          <a:chExt cx="0" cy="0"/>
-        </a:xfrm>
-      </p:grpSpPr>
-      <p:sp>
-        <p:nvSpPr>
-          <p:cNvPr id="2" name="Title 1"/>
-          <p:cNvSpPr>
-            <a:spLocks noGrp="1"/>
-          </p:cNvSpPr>
-          <p:nvPr>
-            <p:ph type="title"/>
-          </p:nvPr>
-        </p:nvSpPr>
-        <p:spPr/>
-        <p:txBody>
-          <a:bodyPr/>
-          <a:lstStyle/>
-          <a:p>
-            <a:r>
-              <a:rPr lang="en-US" dirty="0"/>
-              <a:t>3. </a:t>
-            </a:r>
-            <a:r>
-              <a:rPr lang="en-US" dirty="0" err="1"/>
-              <a:t>Styleguide</a:t>
-            </a:r>
-            <a:r>
-              <a:rPr lang="en-US" dirty="0"/>
-              <a:t> - spacing</a:t>
-            </a:r>
-          </a:p>
-        </p:txBody>
-      </p:sp>
-      <p:sp>
-        <p:nvSpPr>
-          <p:cNvPr id="3" name="Content Placeholder 2"/>
-          <p:cNvSpPr>
-            <a:spLocks noGrp="1"/>
-          </p:cNvSpPr>
-          <p:nvPr>
-            <p:ph idx="1"/>
-          </p:nvPr>
-        </p:nvSpPr>
-        <p:spPr/>
-        <p:txBody>
-          <a:bodyPr>
-            <a:normAutofit/>
-          </a:bodyPr>
-          <a:lstStyle/>
-          <a:p>
-            <a:r>
-              <a:rPr lang="en-US" dirty="0"/>
-              <a:t>Most operators (==, +, -, &lt;-, etc.) should be surrounded by spaces. </a:t>
-            </a:r>
-          </a:p>
-          <a:p>
-            <a:r>
-              <a:rPr lang="en-US" dirty="0"/>
-              <a:t>Put spaces around ~ in double-sided formulas, but omit it in single-sided formulas.</a:t>
-            </a:r>
-          </a:p>
-          <a:p>
-            <a:r>
-              <a:rPr lang="en-US" dirty="0"/>
-              <a:t>Strive to limit your code to 80 characters per line. </a:t>
-            </a:r>
-          </a:p>
-          <a:p>
-            <a:r>
-              <a:rPr lang="en-US" dirty="0"/>
-              <a:t>If a function call is too long to fit on a single line, use one line each for the function name, each argument, and the closing ). This makes the code easier to read and to change later.</a:t>
-            </a:r>
-          </a:p>
-        </p:txBody>
-      </p:sp>
-    </p:spTree>
-    <p:extLst>
-      <p:ext uri="{BB962C8B-B14F-4D97-AF65-F5344CB8AC3E}">
-        <p14:creationId xmlns:p14="http://schemas.microsoft.com/office/powerpoint/2010/main" val="2284194431"/>
-      </p:ext>
-    </p:extLst>
-  </p:cSld>
-  <p:clrMapOvr>
-    <a:masterClrMapping/>
-  </p:clrMapOvr>
-</p:sld>
-</file>
-
-<file path=ppt/slides/slide14.xml><?xml version="1.0" encoding="utf-8"?>
-<p:sld xmlns:a="http://schemas.openxmlformats.org/drawingml/2006/main" xmlns:r="http://schemas.openxmlformats.org/officeDocument/2006/relationships" xmlns:p="http://schemas.openxmlformats.org/presentationml/2006/main">
-  <p:cSld>
-    <p:spTree>
-      <p:nvGrpSpPr>
-        <p:cNvPr id="1" name=""/>
-        <p:cNvGrpSpPr/>
-        <p:nvPr/>
-      </p:nvGrpSpPr>
-      <p:grpSpPr>
-        <a:xfrm>
-          <a:off x="0" y="0"/>
-          <a:ext cx="0" cy="0"/>
-          <a:chOff x="0" y="0"/>
-          <a:chExt cx="0" cy="0"/>
-        </a:xfrm>
-      </p:grpSpPr>
-      <p:sp>
-        <p:nvSpPr>
-          <p:cNvPr id="2" name="Title 1">
-            <a:extLst>
-              <a:ext uri="{FF2B5EF4-FFF2-40B4-BE49-F238E27FC236}">
-                <a16:creationId xmlns:a16="http://schemas.microsoft.com/office/drawing/2014/main" id="{8C262DFF-DFAA-2145-B70F-CA5A38978AB7}"/>
-              </a:ext>
-            </a:extLst>
-          </p:cNvPr>
-          <p:cNvSpPr>
-            <a:spLocks noGrp="1"/>
-          </p:cNvSpPr>
-          <p:nvPr>
-            <p:ph type="title"/>
-          </p:nvPr>
-        </p:nvSpPr>
-        <p:spPr/>
-        <p:txBody>
-          <a:bodyPr/>
-          <a:lstStyle/>
-          <a:p>
-            <a:r>
-              <a:rPr lang="en-US" dirty="0"/>
-              <a:t>4. Read in data</a:t>
-            </a:r>
-          </a:p>
-        </p:txBody>
-      </p:sp>
-      <p:sp>
-        <p:nvSpPr>
-          <p:cNvPr id="3" name="Content Placeholder 2">
-            <a:extLst>
-              <a:ext uri="{FF2B5EF4-FFF2-40B4-BE49-F238E27FC236}">
-                <a16:creationId xmlns:a16="http://schemas.microsoft.com/office/drawing/2014/main" id="{CDCC04A1-B0D6-E043-AA7A-BD151ED470FD}"/>
-              </a:ext>
-            </a:extLst>
-          </p:cNvPr>
-          <p:cNvSpPr>
-            <a:spLocks noGrp="1"/>
-          </p:cNvSpPr>
-          <p:nvPr>
-            <p:ph idx="1"/>
-          </p:nvPr>
-        </p:nvSpPr>
-        <p:spPr>
-          <a:xfrm>
-            <a:off x="628650" y="1460499"/>
-            <a:ext cx="7886700" cy="5032375"/>
-          </a:xfrm>
-        </p:spPr>
-        <p:txBody>
-          <a:bodyPr>
-            <a:normAutofit fontScale="92500" lnSpcReduction="10000"/>
-          </a:bodyPr>
-          <a:lstStyle/>
-          <a:p>
-            <a:r>
-              <a:rPr lang="en-US" sz="2400" dirty="0"/>
-              <a:t>Read in data</a:t>
-            </a:r>
-          </a:p>
-          <a:p>
-            <a:pPr lvl="1"/>
-            <a:r>
-              <a:rPr lang="en-US" dirty="0"/>
-              <a:t>CSV files: </a:t>
-            </a:r>
-          </a:p>
-          <a:p>
-            <a:pPr lvl="2"/>
-            <a:r>
-              <a:rPr lang="en-US" dirty="0" err="1"/>
-              <a:t>iris.df</a:t>
-            </a:r>
-            <a:r>
-              <a:rPr lang="en-US" dirty="0"/>
-              <a:t> &lt;- </a:t>
-            </a:r>
-            <a:r>
-              <a:rPr lang="en-US" dirty="0" err="1"/>
-              <a:t>read.csv</a:t>
-            </a:r>
-            <a:r>
-              <a:rPr lang="en-US" dirty="0"/>
-              <a:t>("</a:t>
-            </a:r>
-            <a:r>
-              <a:rPr lang="en-US" dirty="0" err="1"/>
-              <a:t>iris_df.csv</a:t>
-            </a:r>
-            <a:r>
-              <a:rPr lang="en-US" dirty="0"/>
-              <a:t>")</a:t>
-            </a:r>
-          </a:p>
-          <a:p>
-            <a:pPr lvl="2"/>
-            <a:r>
-              <a:rPr lang="en-US" dirty="0" err="1"/>
-              <a:t>Readr</a:t>
-            </a:r>
-            <a:r>
-              <a:rPr lang="en-US" dirty="0"/>
-              <a:t> package: </a:t>
-            </a:r>
-            <a:r>
-              <a:rPr lang="en-US" dirty="0" err="1"/>
-              <a:t>iris.df</a:t>
-            </a:r>
-            <a:r>
-              <a:rPr lang="en-US" dirty="0"/>
-              <a:t> &lt;- </a:t>
-            </a:r>
-            <a:r>
-              <a:rPr lang="en-US" dirty="0" err="1"/>
-              <a:t>read_csv</a:t>
-            </a:r>
-            <a:r>
-              <a:rPr lang="en-US" dirty="0"/>
-              <a:t>(“</a:t>
-            </a:r>
-            <a:r>
-              <a:rPr lang="en-US" dirty="0" err="1"/>
-              <a:t>iris_df.csv</a:t>
-            </a:r>
-            <a:r>
-              <a:rPr lang="en-US" dirty="0"/>
-              <a:t>”)</a:t>
-            </a:r>
-          </a:p>
-          <a:p>
-            <a:pPr lvl="1"/>
-            <a:r>
-              <a:rPr lang="en-US" dirty="0"/>
-              <a:t>Excel files: </a:t>
-            </a:r>
-          </a:p>
-          <a:p>
-            <a:pPr lvl="2"/>
-            <a:r>
-              <a:rPr lang="en-US" dirty="0"/>
-              <a:t>Use </a:t>
-            </a:r>
-            <a:r>
-              <a:rPr lang="en-US" dirty="0" err="1"/>
-              <a:t>readxl</a:t>
-            </a:r>
-            <a:r>
-              <a:rPr lang="en-US" dirty="0"/>
-              <a:t>() function. Part of </a:t>
-            </a:r>
-            <a:r>
-              <a:rPr lang="en-US" dirty="0" err="1"/>
-              <a:t>tidyverse</a:t>
-            </a:r>
-            <a:r>
-              <a:rPr lang="en-US" dirty="0"/>
-              <a:t>. </a:t>
-            </a:r>
-          </a:p>
-          <a:p>
-            <a:pPr lvl="3"/>
-            <a:r>
-              <a:rPr lang="en-US" sz="1600" dirty="0" err="1"/>
-              <a:t>read_excel</a:t>
-            </a:r>
-            <a:r>
-              <a:rPr lang="en-US" sz="1600" dirty="0"/>
-              <a:t>() reads both </a:t>
-            </a:r>
-            <a:r>
-              <a:rPr lang="en-US" sz="1600" dirty="0" err="1"/>
-              <a:t>xls</a:t>
-            </a:r>
-            <a:r>
-              <a:rPr lang="en-US" sz="1600" dirty="0"/>
-              <a:t> and xlsx files</a:t>
-            </a:r>
-          </a:p>
-          <a:p>
-            <a:pPr lvl="3"/>
-            <a:r>
-              <a:rPr lang="en-US" sz="1600" dirty="0" err="1"/>
-              <a:t>read_excel</a:t>
-            </a:r>
-            <a:r>
-              <a:rPr lang="en-US" sz="1600" dirty="0"/>
-              <a:t>(“</a:t>
-            </a:r>
-            <a:r>
-              <a:rPr lang="en-US" sz="1600" dirty="0" err="1"/>
-              <a:t>dataset.xlsx</a:t>
-            </a:r>
-            <a:r>
-              <a:rPr lang="en-US" sz="1600" dirty="0"/>
-              <a:t>”)</a:t>
-            </a:r>
-          </a:p>
-          <a:p>
-            <a:pPr lvl="2"/>
-            <a:r>
-              <a:rPr lang="en-US" dirty="0"/>
-              <a:t>Other options include ‘xlsx’ and ‘</a:t>
-            </a:r>
-            <a:r>
-              <a:rPr lang="en-US" dirty="0" err="1"/>
-              <a:t>XLConnect</a:t>
-            </a:r>
-            <a:r>
-              <a:rPr lang="en-US" dirty="0"/>
-              <a:t>’ packages</a:t>
-            </a:r>
-          </a:p>
-          <a:p>
-            <a:pPr lvl="2"/>
-            <a:endParaRPr lang="en-US" dirty="0"/>
-          </a:p>
-          <a:p>
-            <a:r>
-              <a:rPr lang="en-US" dirty="0"/>
-              <a:t>R Studio Trick: </a:t>
-            </a:r>
-          </a:p>
-          <a:p>
-            <a:pPr lvl="1"/>
-            <a:r>
-              <a:rPr lang="en-US" dirty="0"/>
-              <a:t>use “import dataset” tool, or navigate to the location of your datafile and click on it and choose “import dataset”</a:t>
-            </a:r>
-          </a:p>
-          <a:p>
-            <a:pPr lvl="1"/>
-            <a:r>
-              <a:rPr lang="en-US" dirty="0"/>
-              <a:t>follow directions on the pop-up box</a:t>
-            </a:r>
-          </a:p>
-          <a:p>
-            <a:pPr lvl="1"/>
-            <a:r>
-              <a:rPr lang="en-US" dirty="0"/>
-              <a:t>copy the code that runs in your console into your script</a:t>
-            </a:r>
-          </a:p>
-        </p:txBody>
-      </p:sp>
-    </p:spTree>
-    <p:extLst>
-      <p:ext uri="{BB962C8B-B14F-4D97-AF65-F5344CB8AC3E}">
-        <p14:creationId xmlns:p14="http://schemas.microsoft.com/office/powerpoint/2010/main" val="2340844737"/>
-      </p:ext>
-    </p:extLst>
-  </p:cSld>
-  <p:clrMapOvr>
-    <a:masterClrMapping/>
-  </p:clrMapOvr>
-</p:sld>
-</file>
-
-<file path=ppt/slides/slide15.xml><?xml version="1.0" encoding="utf-8"?>
-<p:sld xmlns:a="http://schemas.openxmlformats.org/drawingml/2006/main" xmlns:r="http://schemas.openxmlformats.org/officeDocument/2006/relationships" xmlns:p="http://schemas.openxmlformats.org/presentationml/2006/main">
-  <p:cSld>
-    <p:spTree>
-      <p:nvGrpSpPr>
-        <p:cNvPr id="1" name=""/>
-        <p:cNvGrpSpPr/>
-        <p:nvPr/>
-      </p:nvGrpSpPr>
-      <p:grpSpPr>
-        <a:xfrm>
-          <a:off x="0" y="0"/>
-          <a:ext cx="0" cy="0"/>
-          <a:chOff x="0" y="0"/>
-          <a:chExt cx="0" cy="0"/>
-        </a:xfrm>
-      </p:grpSpPr>
-      <p:sp>
-        <p:nvSpPr>
-          <p:cNvPr id="2" name="Title 1"/>
-          <p:cNvSpPr>
-            <a:spLocks noGrp="1"/>
-          </p:cNvSpPr>
-          <p:nvPr>
-            <p:ph type="title"/>
-          </p:nvPr>
-        </p:nvSpPr>
-        <p:spPr/>
-        <p:txBody>
-          <a:bodyPr/>
-          <a:lstStyle/>
-          <a:p>
-            <a:r>
-              <a:rPr lang="en-US" dirty="0"/>
-              <a:t>4. Read in data</a:t>
-            </a:r>
-          </a:p>
-        </p:txBody>
-      </p:sp>
-      <p:sp>
-        <p:nvSpPr>
-          <p:cNvPr id="3" name="Content Placeholder 2"/>
-          <p:cNvSpPr>
-            <a:spLocks noGrp="1"/>
-          </p:cNvSpPr>
-          <p:nvPr>
-            <p:ph idx="1"/>
-          </p:nvPr>
-        </p:nvSpPr>
-        <p:spPr/>
-        <p:txBody>
-          <a:bodyPr/>
-          <a:lstStyle/>
-          <a:p>
-            <a:r>
-              <a:rPr lang="en-US" dirty="0"/>
-              <a:t>Things to think about: </a:t>
-            </a:r>
-          </a:p>
-          <a:p>
-            <a:pPr lvl="1"/>
-            <a:r>
-              <a:rPr lang="en-US" dirty="0"/>
-              <a:t>Is there a header row? </a:t>
-            </a:r>
-          </a:p>
-          <a:p>
-            <a:pPr lvl="1"/>
-            <a:r>
-              <a:rPr lang="en-US" dirty="0"/>
-              <a:t>Do you want R to skip any rows at the top?</a:t>
-            </a:r>
-          </a:p>
-          <a:p>
-            <a:pPr lvl="1"/>
-            <a:r>
-              <a:rPr lang="en-US" dirty="0"/>
-              <a:t>What cell values should be read in as NA’s?</a:t>
-            </a:r>
-          </a:p>
-          <a:p>
-            <a:pPr lvl="1"/>
-            <a:r>
-              <a:rPr lang="en-US" dirty="0"/>
-              <a:t>Do you want R to guess the class of each column?  </a:t>
-            </a:r>
-          </a:p>
-          <a:p>
-            <a:endParaRPr lang="en-US" dirty="0"/>
-          </a:p>
-          <a:p>
-            <a:endParaRPr lang="en-US" dirty="0"/>
-          </a:p>
-        </p:txBody>
-      </p:sp>
-    </p:spTree>
-    <p:extLst>
-      <p:ext uri="{BB962C8B-B14F-4D97-AF65-F5344CB8AC3E}">
-        <p14:creationId xmlns:p14="http://schemas.microsoft.com/office/powerpoint/2010/main" val="1280964767"/>
-      </p:ext>
-    </p:extLst>
-  </p:cSld>
-  <p:clrMapOvr>
-    <a:masterClrMapping/>
-  </p:clrMapOvr>
-</p:sld>
-</file>
-
-<file path=ppt/slides/slide16.xml><?xml version="1.0" encoding="utf-8"?>
-<p:sld xmlns:a="http://schemas.openxmlformats.org/drawingml/2006/main" xmlns:r="http://schemas.openxmlformats.org/officeDocument/2006/relationships" xmlns:p="http://schemas.openxmlformats.org/presentationml/2006/main">
-  <p:cSld>
-    <p:spTree>
-      <p:nvGrpSpPr>
-        <p:cNvPr id="1" name=""/>
-        <p:cNvGrpSpPr/>
-        <p:nvPr/>
-      </p:nvGrpSpPr>
-      <p:grpSpPr>
-        <a:xfrm>
-          <a:off x="0" y="0"/>
-          <a:ext cx="0" cy="0"/>
-          <a:chOff x="0" y="0"/>
-          <a:chExt cx="0" cy="0"/>
-        </a:xfrm>
-      </p:grpSpPr>
-      <p:sp>
-        <p:nvSpPr>
-          <p:cNvPr id="2" name="Title 1">
-            <a:extLst>
-              <a:ext uri="{FF2B5EF4-FFF2-40B4-BE49-F238E27FC236}">
-                <a16:creationId xmlns:a16="http://schemas.microsoft.com/office/drawing/2014/main" id="{048C558D-E455-8C4D-8CF1-4886155AD60D}"/>
-              </a:ext>
-            </a:extLst>
-          </p:cNvPr>
-          <p:cNvSpPr>
-            <a:spLocks noGrp="1"/>
-          </p:cNvSpPr>
-          <p:nvPr>
-            <p:ph type="title"/>
-          </p:nvPr>
-        </p:nvSpPr>
-        <p:spPr/>
-        <p:txBody>
-          <a:bodyPr/>
-          <a:lstStyle/>
-          <a:p>
-            <a:r>
-              <a:rPr lang="en-US" dirty="0"/>
-              <a:t>5. Tibbles</a:t>
-            </a:r>
-          </a:p>
-        </p:txBody>
-      </p:sp>
-      <p:sp>
-        <p:nvSpPr>
-          <p:cNvPr id="3" name="Content Placeholder 2">
-            <a:extLst>
-              <a:ext uri="{FF2B5EF4-FFF2-40B4-BE49-F238E27FC236}">
-                <a16:creationId xmlns:a16="http://schemas.microsoft.com/office/drawing/2014/main" id="{3BD19ABD-39E4-AE42-B840-496BD8F4B528}"/>
-              </a:ext>
-            </a:extLst>
-          </p:cNvPr>
-          <p:cNvSpPr>
-            <a:spLocks noGrp="1"/>
-          </p:cNvSpPr>
-          <p:nvPr>
-            <p:ph idx="1"/>
-          </p:nvPr>
-        </p:nvSpPr>
-        <p:spPr>
-          <a:xfrm>
-            <a:off x="628650" y="1690689"/>
-            <a:ext cx="7886700" cy="4742058"/>
-          </a:xfrm>
-        </p:spPr>
-        <p:txBody>
-          <a:bodyPr>
-            <a:normAutofit lnSpcReduction="10000"/>
-          </a:bodyPr>
-          <a:lstStyle/>
-          <a:p>
-            <a:r>
-              <a:rPr lang="en-US" dirty="0"/>
-              <a:t>Base R uses data frames. </a:t>
-            </a:r>
-            <a:r>
-              <a:rPr lang="en-US" dirty="0" err="1"/>
-              <a:t>Readr</a:t>
-            </a:r>
-            <a:r>
-              <a:rPr lang="en-US" dirty="0"/>
-              <a:t> and </a:t>
-            </a:r>
-            <a:r>
-              <a:rPr lang="en-US" dirty="0" err="1"/>
-              <a:t>readxl</a:t>
-            </a:r>
-            <a:r>
-              <a:rPr lang="en-US" dirty="0"/>
-              <a:t> automatically create </a:t>
-            </a:r>
-            <a:r>
-              <a:rPr lang="en-US" dirty="0" err="1"/>
-              <a:t>tibbles</a:t>
-            </a:r>
-            <a:r>
-              <a:rPr lang="en-US" dirty="0"/>
-              <a:t>. </a:t>
-            </a:r>
-          </a:p>
-          <a:p>
-            <a:r>
-              <a:rPr lang="en-US" dirty="0"/>
-              <a:t>Tibbles are </a:t>
-            </a:r>
-            <a:r>
-              <a:rPr lang="en-US" dirty="0" err="1"/>
-              <a:t>dataframes</a:t>
-            </a:r>
-            <a:r>
-              <a:rPr lang="en-US" dirty="0"/>
-              <a:t>, but they have slightly different properties than traditional </a:t>
-            </a:r>
-            <a:r>
-              <a:rPr lang="en-US" dirty="0" err="1"/>
-              <a:t>dataframes</a:t>
-            </a:r>
-            <a:endParaRPr lang="en-US" dirty="0"/>
-          </a:p>
-          <a:p>
-            <a:r>
-              <a:rPr lang="en-US" dirty="0"/>
-              <a:t>Tibbles do not automatically change the class of the input, names of variables, or create row names</a:t>
-            </a:r>
-          </a:p>
-          <a:p>
-            <a:r>
-              <a:rPr lang="en-US" dirty="0"/>
-              <a:t>Tibbles can handle invalid R variable names (e.g. numbers, punctuation)</a:t>
-            </a:r>
-          </a:p>
-          <a:p>
-            <a:r>
-              <a:rPr lang="en-US" dirty="0"/>
-              <a:t>Tibbles only show the first 10 rows when you ‘print’</a:t>
-            </a:r>
-          </a:p>
-          <a:p>
-            <a:r>
-              <a:rPr lang="en-US" dirty="0"/>
-              <a:t>Tibbles don’t always play well with the single square brackets []</a:t>
-            </a:r>
-          </a:p>
-        </p:txBody>
-      </p:sp>
-    </p:spTree>
-    <p:extLst>
-      <p:ext uri="{BB962C8B-B14F-4D97-AF65-F5344CB8AC3E}">
-        <p14:creationId xmlns:p14="http://schemas.microsoft.com/office/powerpoint/2010/main" val="2629798875"/>
-      </p:ext>
-    </p:extLst>
-  </p:cSld>
-  <p:clrMapOvr>
-    <a:masterClrMapping/>
-  </p:clrMapOvr>
-</p:sld>
-</file>
-
-<file path=ppt/slides/slide17.xml><?xml version="1.0" encoding="utf-8"?>
-<p:sld xmlns:a="http://schemas.openxmlformats.org/drawingml/2006/main" xmlns:r="http://schemas.openxmlformats.org/officeDocument/2006/relationships" xmlns:p="http://schemas.openxmlformats.org/presentationml/2006/main">
-  <p:cSld>
-    <p:spTree>
-      <p:nvGrpSpPr>
-        <p:cNvPr id="1" name=""/>
-        <p:cNvGrpSpPr/>
-        <p:nvPr/>
-      </p:nvGrpSpPr>
-      <p:grpSpPr>
-        <a:xfrm>
-          <a:off x="0" y="0"/>
-          <a:ext cx="0" cy="0"/>
-          <a:chOff x="0" y="0"/>
-          <a:chExt cx="0" cy="0"/>
-        </a:xfrm>
-      </p:grpSpPr>
-      <p:sp>
-        <p:nvSpPr>
-          <p:cNvPr id="2" name="Title 1"/>
-          <p:cNvSpPr>
-            <a:spLocks noGrp="1"/>
-          </p:cNvSpPr>
-          <p:nvPr>
-            <p:ph type="title"/>
-          </p:nvPr>
-        </p:nvSpPr>
-        <p:spPr/>
-        <p:txBody>
-          <a:bodyPr>
-            <a:normAutofit/>
-          </a:bodyPr>
-          <a:lstStyle/>
-          <a:p>
-            <a:r>
-              <a:rPr lang="en-US" dirty="0"/>
-              <a:t>6. Explore your data</a:t>
-            </a:r>
-          </a:p>
-        </p:txBody>
-      </p:sp>
-      <p:sp>
-        <p:nvSpPr>
-          <p:cNvPr id="3" name="Content Placeholder 2"/>
-          <p:cNvSpPr>
-            <a:spLocks noGrp="1"/>
-          </p:cNvSpPr>
-          <p:nvPr>
-            <p:ph idx="1"/>
-          </p:nvPr>
-        </p:nvSpPr>
-        <p:spPr>
-          <a:xfrm>
-            <a:off x="628650" y="1690689"/>
-            <a:ext cx="7886700" cy="3486222"/>
-          </a:xfrm>
-        </p:spPr>
-        <p:txBody>
-          <a:bodyPr numCol="2">
-            <a:normAutofit/>
-          </a:bodyPr>
-          <a:lstStyle/>
-          <a:p>
-            <a:r>
-              <a:rPr lang="en-US" dirty="0"/>
-              <a:t>Size</a:t>
-            </a:r>
-          </a:p>
-          <a:p>
-            <a:pPr lvl="1"/>
-            <a:r>
-              <a:rPr lang="en-US" dirty="0"/>
-              <a:t>dim()</a:t>
-            </a:r>
-          </a:p>
-          <a:p>
-            <a:pPr lvl="1"/>
-            <a:r>
-              <a:rPr lang="en-US" dirty="0" err="1"/>
-              <a:t>nrow</a:t>
-            </a:r>
-            <a:r>
-              <a:rPr lang="en-US" dirty="0"/>
-              <a:t>()</a:t>
-            </a:r>
-          </a:p>
-          <a:p>
-            <a:pPr lvl="1"/>
-            <a:r>
-              <a:rPr lang="en-US" dirty="0" err="1"/>
-              <a:t>ncol</a:t>
-            </a:r>
-            <a:r>
-              <a:rPr lang="en-US" dirty="0"/>
-              <a:t>()</a:t>
-            </a:r>
-          </a:p>
-          <a:p>
-            <a:r>
-              <a:rPr lang="en-US" dirty="0"/>
-              <a:t>Content</a:t>
-            </a:r>
-          </a:p>
-          <a:p>
-            <a:pPr lvl="1"/>
-            <a:r>
-              <a:rPr lang="en-US" dirty="0"/>
-              <a:t>head()</a:t>
-            </a:r>
-          </a:p>
-          <a:p>
-            <a:pPr lvl="1"/>
-            <a:r>
-              <a:rPr lang="en-US" dirty="0"/>
-              <a:t>tail()</a:t>
-            </a:r>
-          </a:p>
-          <a:p>
-            <a:pPr marL="457200" lvl="1" indent="0">
-              <a:buNone/>
-            </a:pPr>
-            <a:endParaRPr lang="en-US" dirty="0"/>
-          </a:p>
-          <a:p>
-            <a:r>
-              <a:rPr lang="en-US" dirty="0"/>
-              <a:t>Names</a:t>
-            </a:r>
-          </a:p>
-          <a:p>
-            <a:pPr lvl="1"/>
-            <a:r>
-              <a:rPr lang="en-US" dirty="0" err="1"/>
-              <a:t>colnames</a:t>
-            </a:r>
-            <a:r>
-              <a:rPr lang="en-US" dirty="0"/>
-              <a:t>()</a:t>
-            </a:r>
-          </a:p>
-          <a:p>
-            <a:pPr lvl="1"/>
-            <a:r>
-              <a:rPr lang="en-US" dirty="0" err="1"/>
-              <a:t>rownames</a:t>
-            </a:r>
-            <a:r>
-              <a:rPr lang="en-US" dirty="0"/>
-              <a:t>()</a:t>
-            </a:r>
-          </a:p>
-          <a:p>
-            <a:pPr lvl="1"/>
-            <a:endParaRPr lang="en-US" dirty="0"/>
-          </a:p>
-          <a:p>
-            <a:r>
-              <a:rPr lang="en-US" dirty="0"/>
-              <a:t>Summary</a:t>
-            </a:r>
-          </a:p>
-          <a:p>
-            <a:pPr lvl="1"/>
-            <a:r>
-              <a:rPr lang="en-US" dirty="0"/>
-              <a:t>str()</a:t>
-            </a:r>
-          </a:p>
-          <a:p>
-            <a:pPr lvl="1"/>
-            <a:r>
-              <a:rPr lang="en-US" dirty="0"/>
-              <a:t>summary()</a:t>
-            </a:r>
-          </a:p>
-        </p:txBody>
-      </p:sp>
-    </p:spTree>
-    <p:extLst>
-      <p:ext uri="{BB962C8B-B14F-4D97-AF65-F5344CB8AC3E}">
-        <p14:creationId xmlns:p14="http://schemas.microsoft.com/office/powerpoint/2010/main" val="2596782662"/>
-      </p:ext>
-    </p:extLst>
-  </p:cSld>
-  <p:clrMapOvr>
-    <a:masterClrMapping/>
-  </p:clrMapOvr>
-</p:sld>
-</file>
-
-<file path=ppt/slides/slide18.xml><?xml version="1.0" encoding="utf-8"?>
-<p:sld xmlns:a="http://schemas.openxmlformats.org/drawingml/2006/main" xmlns:r="http://schemas.openxmlformats.org/officeDocument/2006/relationships" xmlns:p="http://schemas.openxmlformats.org/presentationml/2006/main">
-  <p:cSld>
-    <p:spTree>
-      <p:nvGrpSpPr>
-        <p:cNvPr id="1" name=""/>
-        <p:cNvGrpSpPr/>
-        <p:nvPr/>
-      </p:nvGrpSpPr>
-      <p:grpSpPr>
-        <a:xfrm>
-          <a:off x="0" y="0"/>
-          <a:ext cx="0" cy="0"/>
-          <a:chOff x="0" y="0"/>
-          <a:chExt cx="0" cy="0"/>
-        </a:xfrm>
-      </p:grpSpPr>
-      <p:sp>
-        <p:nvSpPr>
-          <p:cNvPr id="2" name="Title 1">
-            <a:extLst>
-              <a:ext uri="{FF2B5EF4-FFF2-40B4-BE49-F238E27FC236}">
-                <a16:creationId xmlns:a16="http://schemas.microsoft.com/office/drawing/2014/main" id="{9537FB81-6C84-2C4B-98D8-4AAE55F72074}"/>
-              </a:ext>
-            </a:extLst>
-          </p:cNvPr>
-          <p:cNvSpPr>
-            <a:spLocks noGrp="1"/>
-          </p:cNvSpPr>
-          <p:nvPr>
-            <p:ph type="title"/>
-          </p:nvPr>
-        </p:nvSpPr>
-        <p:spPr/>
-        <p:txBody>
-          <a:bodyPr/>
-          <a:lstStyle/>
-          <a:p>
-            <a:r>
-              <a:rPr lang="en-US" dirty="0"/>
-              <a:t>7. Dealing with classes</a:t>
-            </a:r>
-          </a:p>
-        </p:txBody>
-      </p:sp>
-      <p:sp>
-        <p:nvSpPr>
-          <p:cNvPr id="3" name="Content Placeholder 2">
-            <a:extLst>
-              <a:ext uri="{FF2B5EF4-FFF2-40B4-BE49-F238E27FC236}">
-                <a16:creationId xmlns:a16="http://schemas.microsoft.com/office/drawing/2014/main" id="{57C475CE-9A92-CD4F-955A-E2FF25D6D84B}"/>
-              </a:ext>
-            </a:extLst>
-          </p:cNvPr>
-          <p:cNvSpPr>
-            <a:spLocks noGrp="1"/>
-          </p:cNvSpPr>
-          <p:nvPr>
-            <p:ph idx="1"/>
-          </p:nvPr>
-        </p:nvSpPr>
-        <p:spPr/>
-        <p:txBody>
-          <a:bodyPr/>
-          <a:lstStyle/>
-          <a:p>
-            <a:r>
-              <a:rPr lang="en-US" dirty="0"/>
-              <a:t>Factors are commonly used in ecology/evolution</a:t>
-            </a:r>
-          </a:p>
-          <a:p>
-            <a:pPr lvl="1"/>
-            <a:endParaRPr lang="en-US" dirty="0"/>
-          </a:p>
-          <a:p>
-            <a:r>
-              <a:rPr lang="en-US" dirty="0"/>
-              <a:t>If a column is not in the correct class, change it using</a:t>
-            </a:r>
-          </a:p>
-          <a:p>
-            <a:pPr lvl="1"/>
-            <a:r>
-              <a:rPr lang="en-US" dirty="0" err="1"/>
-              <a:t>as.character</a:t>
-            </a:r>
-            <a:r>
-              <a:rPr lang="en-US" dirty="0"/>
-              <a:t>()</a:t>
-            </a:r>
-          </a:p>
-          <a:p>
-            <a:pPr lvl="1"/>
-            <a:r>
-              <a:rPr lang="en-US" dirty="0" err="1"/>
-              <a:t>as.factor</a:t>
-            </a:r>
-            <a:r>
-              <a:rPr lang="en-US" dirty="0"/>
-              <a:t>()</a:t>
-            </a:r>
-          </a:p>
-          <a:p>
-            <a:pPr lvl="1"/>
-            <a:r>
-              <a:rPr lang="en-US" dirty="0" err="1"/>
-              <a:t>as.numeric</a:t>
-            </a:r>
-            <a:r>
-              <a:rPr lang="en-US" dirty="0"/>
-              <a:t>()</a:t>
-            </a:r>
-          </a:p>
-          <a:p>
-            <a:pPr lvl="1"/>
-            <a:r>
-              <a:rPr lang="en-US" dirty="0" err="1"/>
-              <a:t>as.integer</a:t>
-            </a:r>
-            <a:r>
-              <a:rPr lang="en-US" dirty="0"/>
-              <a:t>() </a:t>
-            </a:r>
-          </a:p>
-          <a:p>
-            <a:pPr lvl="1"/>
-            <a:r>
-              <a:rPr lang="en-US" dirty="0" err="1"/>
-              <a:t>Etc</a:t>
-            </a:r>
-            <a:r>
-              <a:rPr lang="en-US" dirty="0"/>
-              <a:t>…</a:t>
-            </a:r>
-          </a:p>
-          <a:p>
-            <a:pPr lvl="1"/>
-            <a:endParaRPr lang="en-US" dirty="0"/>
-          </a:p>
-        </p:txBody>
-      </p:sp>
-    </p:spTree>
-    <p:extLst>
-      <p:ext uri="{BB962C8B-B14F-4D97-AF65-F5344CB8AC3E}">
-        <p14:creationId xmlns:p14="http://schemas.microsoft.com/office/powerpoint/2010/main" val="601597310"/>
-      </p:ext>
-    </p:extLst>
-  </p:cSld>
-  <p:clrMapOvr>
-    <a:masterClrMapping/>
-  </p:clrMapOvr>
-</p:sld>
-</file>
-
-<file path=ppt/slides/slide19.xml><?xml version="1.0" encoding="utf-8"?>
-<p:sld xmlns:a="http://schemas.openxmlformats.org/drawingml/2006/main" xmlns:r="http://schemas.openxmlformats.org/officeDocument/2006/relationships" xmlns:p="http://schemas.openxmlformats.org/presentationml/2006/main">
-  <p:cSld>
-    <p:spTree>
-      <p:nvGrpSpPr>
-        <p:cNvPr id="1" name=""/>
-        <p:cNvGrpSpPr/>
-        <p:nvPr/>
-      </p:nvGrpSpPr>
-      <p:grpSpPr>
-        <a:xfrm>
-          <a:off x="0" y="0"/>
-          <a:ext cx="0" cy="0"/>
-          <a:chOff x="0" y="0"/>
-          <a:chExt cx="0" cy="0"/>
-        </a:xfrm>
-      </p:grpSpPr>
-      <p:sp>
-        <p:nvSpPr>
-          <p:cNvPr id="2" name="Title 1">
-            <a:extLst>
-              <a:ext uri="{FF2B5EF4-FFF2-40B4-BE49-F238E27FC236}">
-                <a16:creationId xmlns:a16="http://schemas.microsoft.com/office/drawing/2014/main" id="{F0E3E0B7-F782-EE4E-85AD-71CDCC4B720C}"/>
-              </a:ext>
-            </a:extLst>
-          </p:cNvPr>
-          <p:cNvSpPr>
-            <a:spLocks noGrp="1"/>
-          </p:cNvSpPr>
-          <p:nvPr>
-            <p:ph type="title"/>
-          </p:nvPr>
-        </p:nvSpPr>
-        <p:spPr/>
-        <p:txBody>
-          <a:bodyPr/>
-          <a:lstStyle/>
-          <a:p>
-            <a:r>
-              <a:rPr lang="en-US" dirty="0"/>
-              <a:t>7. Dealing with classes - Dates</a:t>
-            </a:r>
-          </a:p>
-        </p:txBody>
-      </p:sp>
-      <p:sp>
-        <p:nvSpPr>
-          <p:cNvPr id="3" name="Content Placeholder 2">
-            <a:extLst>
-              <a:ext uri="{FF2B5EF4-FFF2-40B4-BE49-F238E27FC236}">
-                <a16:creationId xmlns:a16="http://schemas.microsoft.com/office/drawing/2014/main" id="{E0C55E3F-E621-4C43-85F8-8A1BA0A85114}"/>
-              </a:ext>
-            </a:extLst>
-          </p:cNvPr>
-          <p:cNvSpPr>
-            <a:spLocks noGrp="1"/>
-          </p:cNvSpPr>
-          <p:nvPr>
-            <p:ph idx="1"/>
-          </p:nvPr>
-        </p:nvSpPr>
-        <p:spPr/>
-        <p:txBody>
-          <a:bodyPr/>
-          <a:lstStyle/>
-          <a:p>
-            <a:r>
-              <a:rPr lang="en-US" dirty="0"/>
-              <a:t>Class "</a:t>
-            </a:r>
-            <a:r>
-              <a:rPr lang="en-US" dirty="0" err="1"/>
-              <a:t>POSIXct</a:t>
-            </a:r>
-            <a:r>
-              <a:rPr lang="en-US" dirty="0"/>
-              <a:t>" represents the (signed) number of seconds since the beginning of 1970 (in the UTC time zone) as a numeric vector. </a:t>
-            </a:r>
-          </a:p>
-          <a:p>
-            <a:r>
-              <a:rPr lang="en-US" dirty="0"/>
-              <a:t>ISO8601 – international standard  with components organized biggest to smallest (year, month, day, hour, min, sec)</a:t>
-            </a:r>
-          </a:p>
-          <a:p>
-            <a:r>
-              <a:rPr lang="en-US" dirty="0" err="1"/>
-              <a:t>Lubridate</a:t>
-            </a:r>
-            <a:r>
-              <a:rPr lang="en-US" dirty="0"/>
-              <a:t> package (</a:t>
-            </a:r>
-            <a:r>
-              <a:rPr lang="en-US" dirty="0" err="1"/>
-              <a:t>tidyverse</a:t>
-            </a:r>
-            <a:r>
-              <a:rPr lang="en-US" dirty="0"/>
-              <a:t> but not part of core installation)</a:t>
-            </a:r>
-          </a:p>
-          <a:p>
-            <a:r>
-              <a:rPr lang="en-US" dirty="0"/>
-              <a:t>Use functions like ‘</a:t>
-            </a:r>
-            <a:r>
-              <a:rPr lang="en-US" dirty="0" err="1"/>
-              <a:t>ymd</a:t>
-            </a:r>
-            <a:r>
-              <a:rPr lang="en-US" dirty="0"/>
-              <a:t>’, ‘</a:t>
-            </a:r>
-            <a:r>
-              <a:rPr lang="en-US" dirty="0" err="1"/>
-              <a:t>dmy</a:t>
-            </a:r>
-            <a:r>
-              <a:rPr lang="en-US" dirty="0"/>
-              <a:t>’, </a:t>
-            </a:r>
-          </a:p>
-          <a:p>
-            <a:endParaRPr lang="en-US" dirty="0"/>
-          </a:p>
-        </p:txBody>
-      </p:sp>
-    </p:spTree>
-    <p:extLst>
-      <p:ext uri="{BB962C8B-B14F-4D97-AF65-F5344CB8AC3E}">
-        <p14:creationId xmlns:p14="http://schemas.microsoft.com/office/powerpoint/2010/main" val="1585831353"/>
+        <p14:creationId xmlns:p14="http://schemas.microsoft.com/office/powerpoint/2010/main" val="2040361328"/>
       </p:ext>
     </p:extLst>
   </p:cSld>
@@ -5272,36 +3833,6 @@
             </a:pPr>
             <a:r>
               <a:rPr lang="en-US" dirty="0"/>
-              <a:t>Make great datasheets</a:t>
-            </a:r>
-          </a:p>
-          <a:p>
-            <a:pPr marL="514350" indent="-514350">
-              <a:buFont typeface="+mj-lt"/>
-              <a:buAutoNum type="arabicPeriod"/>
-            </a:pPr>
-            <a:r>
-              <a:rPr lang="en-US" dirty="0"/>
-              <a:t>Make a tidy database</a:t>
-            </a:r>
-          </a:p>
-          <a:p>
-            <a:pPr marL="514350" indent="-514350">
-              <a:buFont typeface="+mj-lt"/>
-              <a:buAutoNum type="arabicPeriod"/>
-            </a:pPr>
-            <a:r>
-              <a:rPr lang="en-US" dirty="0"/>
-              <a:t>Code with style</a:t>
-            </a:r>
-          </a:p>
-          <a:p>
-            <a:pPr marL="514350" indent="-514350">
-              <a:buFont typeface="+mj-lt"/>
-              <a:buAutoNum type="arabicPeriod"/>
-            </a:pPr>
-            <a:r>
-              <a:rPr lang="en-US" dirty="0"/>
               <a:t>Read in data</a:t>
             </a:r>
           </a:p>
@@ -5337,1377 +3868,6 @@
   <p:clrMapOvr>
     <a:masterClrMapping/>
   </p:clrMapOvr>
-</p:sld>
-</file>
-
-<file path=ppt/slides/slide20.xml><?xml version="1.0" encoding="utf-8"?>
-<p:sld xmlns:a="http://schemas.openxmlformats.org/drawingml/2006/main" xmlns:r="http://schemas.openxmlformats.org/officeDocument/2006/relationships" xmlns:p="http://schemas.openxmlformats.org/presentationml/2006/main">
-  <p:cSld>
-    <p:spTree>
-      <p:nvGrpSpPr>
-        <p:cNvPr id="1" name=""/>
-        <p:cNvGrpSpPr/>
-        <p:nvPr/>
-      </p:nvGrpSpPr>
-      <p:grpSpPr>
-        <a:xfrm>
-          <a:off x="0" y="0"/>
-          <a:ext cx="0" cy="0"/>
-          <a:chOff x="0" y="0"/>
-          <a:chExt cx="0" cy="0"/>
-        </a:xfrm>
-      </p:grpSpPr>
-      <p:sp>
-        <p:nvSpPr>
-          <p:cNvPr id="2" name="Title 1">
-            <a:extLst>
-              <a:ext uri="{FF2B5EF4-FFF2-40B4-BE49-F238E27FC236}">
-                <a16:creationId xmlns:a16="http://schemas.microsoft.com/office/drawing/2014/main" id="{12E18977-9083-6F43-B6C5-4C70B958E7BC}"/>
-              </a:ext>
-            </a:extLst>
-          </p:cNvPr>
-          <p:cNvSpPr>
-            <a:spLocks noGrp="1"/>
-          </p:cNvSpPr>
-          <p:nvPr>
-            <p:ph type="title"/>
-          </p:nvPr>
-        </p:nvSpPr>
-        <p:spPr/>
-        <p:txBody>
-          <a:bodyPr/>
-          <a:lstStyle/>
-          <a:p>
-            <a:endParaRPr lang="en-US"/>
-          </a:p>
-        </p:txBody>
-      </p:sp>
-      <p:sp>
-        <p:nvSpPr>
-          <p:cNvPr id="3" name="Content Placeholder 2">
-            <a:extLst>
-              <a:ext uri="{FF2B5EF4-FFF2-40B4-BE49-F238E27FC236}">
-                <a16:creationId xmlns:a16="http://schemas.microsoft.com/office/drawing/2014/main" id="{D3E51221-3EE7-7344-AE4F-D23806F8F69A}"/>
-              </a:ext>
-            </a:extLst>
-          </p:cNvPr>
-          <p:cNvSpPr>
-            <a:spLocks noGrp="1"/>
-          </p:cNvSpPr>
-          <p:nvPr>
-            <p:ph idx="1"/>
-          </p:nvPr>
-        </p:nvSpPr>
-        <p:spPr/>
-        <p:txBody>
-          <a:bodyPr/>
-          <a:lstStyle/>
-          <a:p>
-            <a:endParaRPr lang="en-US"/>
-          </a:p>
-        </p:txBody>
-      </p:sp>
-    </p:spTree>
-    <p:extLst>
-      <p:ext uri="{BB962C8B-B14F-4D97-AF65-F5344CB8AC3E}">
-        <p14:creationId xmlns:p14="http://schemas.microsoft.com/office/powerpoint/2010/main" val="2040361328"/>
-      </p:ext>
-    </p:extLst>
-  </p:cSld>
-  <p:clrMapOvr>
-    <a:masterClrMapping/>
-  </p:clrMapOvr>
-</p:sld>
-</file>
-
-<file path=ppt/slides/slide21.xml><?xml version="1.0" encoding="utf-8"?>
-<p:sld xmlns:a="http://schemas.openxmlformats.org/drawingml/2006/main" xmlns:r="http://schemas.openxmlformats.org/officeDocument/2006/relationships" xmlns:p="http://schemas.openxmlformats.org/presentationml/2006/main">
-  <p:cSld>
-    <p:spTree>
-      <p:nvGrpSpPr>
-        <p:cNvPr id="1" name=""/>
-        <p:cNvGrpSpPr/>
-        <p:nvPr/>
-      </p:nvGrpSpPr>
-      <p:grpSpPr>
-        <a:xfrm>
-          <a:off x="0" y="0"/>
-          <a:ext cx="0" cy="0"/>
-          <a:chOff x="0" y="0"/>
-          <a:chExt cx="0" cy="0"/>
-        </a:xfrm>
-      </p:grpSpPr>
-      <p:sp>
-        <p:nvSpPr>
-          <p:cNvPr id="2" name="Title 1">
-            <a:extLst>
-              <a:ext uri="{FF2B5EF4-FFF2-40B4-BE49-F238E27FC236}">
-                <a16:creationId xmlns:a16="http://schemas.microsoft.com/office/drawing/2014/main" id="{40684D42-A734-D145-8884-D714A8E6D338}"/>
-              </a:ext>
-            </a:extLst>
-          </p:cNvPr>
-          <p:cNvSpPr>
-            <a:spLocks noGrp="1"/>
-          </p:cNvSpPr>
-          <p:nvPr>
-            <p:ph type="title"/>
-          </p:nvPr>
-        </p:nvSpPr>
-        <p:spPr/>
-        <p:txBody>
-          <a:bodyPr/>
-          <a:lstStyle/>
-          <a:p>
-            <a:endParaRPr lang="en-US"/>
-          </a:p>
-        </p:txBody>
-      </p:sp>
-      <p:sp>
-        <p:nvSpPr>
-          <p:cNvPr id="3" name="Content Placeholder 2">
-            <a:extLst>
-              <a:ext uri="{FF2B5EF4-FFF2-40B4-BE49-F238E27FC236}">
-                <a16:creationId xmlns:a16="http://schemas.microsoft.com/office/drawing/2014/main" id="{B6696726-045F-7844-89E0-EC72DA3E1E35}"/>
-              </a:ext>
-            </a:extLst>
-          </p:cNvPr>
-          <p:cNvSpPr>
-            <a:spLocks noGrp="1"/>
-          </p:cNvSpPr>
-          <p:nvPr>
-            <p:ph idx="1"/>
-          </p:nvPr>
-        </p:nvSpPr>
-        <p:spPr/>
-        <p:txBody>
-          <a:bodyPr/>
-          <a:lstStyle/>
-          <a:p>
-            <a:endParaRPr lang="en-US"/>
-          </a:p>
-        </p:txBody>
-      </p:sp>
-    </p:spTree>
-    <p:extLst>
-      <p:ext uri="{BB962C8B-B14F-4D97-AF65-F5344CB8AC3E}">
-        <p14:creationId xmlns:p14="http://schemas.microsoft.com/office/powerpoint/2010/main" val="992108563"/>
-      </p:ext>
-    </p:extLst>
-  </p:cSld>
-  <p:clrMapOvr>
-    <a:masterClrMapping/>
-  </p:clrMapOvr>
-</p:sld>
-</file>
-
-<file path=ppt/slides/slide22.xml><?xml version="1.0" encoding="utf-8"?>
-<p:sld xmlns:a="http://schemas.openxmlformats.org/drawingml/2006/main" xmlns:r="http://schemas.openxmlformats.org/officeDocument/2006/relationships" xmlns:p="http://schemas.openxmlformats.org/presentationml/2006/main">
-  <p:cSld>
-    <p:spTree>
-      <p:nvGrpSpPr>
-        <p:cNvPr id="1" name=""/>
-        <p:cNvGrpSpPr/>
-        <p:nvPr/>
-      </p:nvGrpSpPr>
-      <p:grpSpPr>
-        <a:xfrm>
-          <a:off x="0" y="0"/>
-          <a:ext cx="0" cy="0"/>
-          <a:chOff x="0" y="0"/>
-          <a:chExt cx="0" cy="0"/>
-        </a:xfrm>
-      </p:grpSpPr>
-      <p:sp>
-        <p:nvSpPr>
-          <p:cNvPr id="2" name="Title 1"/>
-          <p:cNvSpPr>
-            <a:spLocks noGrp="1"/>
-          </p:cNvSpPr>
-          <p:nvPr>
-            <p:ph type="title"/>
-          </p:nvPr>
-        </p:nvSpPr>
-        <p:spPr>
-          <a:xfrm>
-            <a:off x="457200" y="76200"/>
-            <a:ext cx="8229600" cy="868362"/>
-          </a:xfrm>
-        </p:spPr>
-        <p:txBody>
-          <a:bodyPr/>
-          <a:lstStyle/>
-          <a:p>
-            <a:r>
-              <a:rPr lang="en-US" dirty="0"/>
-              <a:t>Preparing your data for R</a:t>
-            </a:r>
-          </a:p>
-        </p:txBody>
-      </p:sp>
-      <p:sp>
-        <p:nvSpPr>
-          <p:cNvPr id="3" name="Content Placeholder 2"/>
-          <p:cNvSpPr>
-            <a:spLocks noGrp="1"/>
-          </p:cNvSpPr>
-          <p:nvPr>
-            <p:ph idx="1"/>
-          </p:nvPr>
-        </p:nvSpPr>
-        <p:spPr>
-          <a:xfrm>
-            <a:off x="457200" y="1143000"/>
-            <a:ext cx="8229600" cy="5410200"/>
-          </a:xfrm>
-        </p:spPr>
-        <p:txBody>
-          <a:bodyPr>
-            <a:noAutofit/>
-          </a:bodyPr>
-          <a:lstStyle/>
-          <a:p>
-            <a:r>
-              <a:rPr lang="en-US" sz="2400" dirty="0"/>
-              <a:t>Data should be in csv or Excel format</a:t>
-            </a:r>
-          </a:p>
-          <a:p>
-            <a:pPr lvl="1"/>
-            <a:r>
-              <a:rPr lang="en-US" sz="2400" dirty="0"/>
-              <a:t>No special formatting, filters, comments etc.</a:t>
-            </a:r>
-          </a:p>
-          <a:p>
-            <a:r>
-              <a:rPr lang="en-US" sz="2400" dirty="0"/>
-              <a:t>Name your variables well </a:t>
-            </a:r>
-          </a:p>
-          <a:p>
-            <a:pPr lvl="1"/>
-            <a:r>
-              <a:rPr lang="en-US" sz="2400" dirty="0"/>
-              <a:t>self-explanatory, unique, lowercase, short-</a:t>
-            </a:r>
-            <a:r>
-              <a:rPr lang="en-US" sz="2400" dirty="0" err="1"/>
-              <a:t>ish</a:t>
-            </a:r>
-            <a:r>
-              <a:rPr lang="en-US" sz="2400" dirty="0"/>
-              <a:t>, one-word names starting with letters (not #’s) are best</a:t>
-            </a:r>
-          </a:p>
-          <a:p>
-            <a:r>
-              <a:rPr lang="en-US" sz="2400" dirty="0"/>
-              <a:t>Correct spelling</a:t>
-            </a:r>
-          </a:p>
-          <a:p>
-            <a:r>
-              <a:rPr lang="en-US" sz="2400" dirty="0"/>
-              <a:t>Identical capitalization (e.g. </a:t>
-            </a:r>
-            <a:r>
-              <a:rPr lang="en-US" sz="2400" dirty="0" err="1"/>
-              <a:t>Premna</a:t>
-            </a:r>
-            <a:r>
-              <a:rPr lang="en-US" sz="2400" dirty="0"/>
-              <a:t> vs </a:t>
-            </a:r>
-            <a:r>
-              <a:rPr lang="en-US" sz="2400" dirty="0" err="1"/>
-              <a:t>premna</a:t>
-            </a:r>
-            <a:r>
-              <a:rPr lang="en-US" sz="2400" dirty="0"/>
-              <a:t>)</a:t>
-            </a:r>
-          </a:p>
-          <a:p>
-            <a:r>
-              <a:rPr lang="en-US" sz="2400" dirty="0"/>
-              <a:t>If </a:t>
-            </a:r>
-            <a:r>
-              <a:rPr lang="en-US" sz="2400" dirty="0" err="1"/>
-              <a:t>trt</a:t>
-            </a:r>
-            <a:r>
-              <a:rPr lang="en-US" sz="2400" dirty="0"/>
-              <a:t> &lt;- c(3, 4, 5), calling </a:t>
-            </a:r>
-            <a:r>
-              <a:rPr lang="en-US" sz="2400" dirty="0" err="1"/>
-              <a:t>Trt</a:t>
-            </a:r>
-            <a:r>
-              <a:rPr lang="en-US" sz="2400" dirty="0"/>
-              <a:t> does not work!</a:t>
-            </a:r>
-          </a:p>
-          <a:p>
-            <a:r>
-              <a:rPr lang="en-US" sz="2400" dirty="0"/>
-              <a:t>No commas within cells if using csv</a:t>
-            </a:r>
-          </a:p>
-          <a:p>
-            <a:r>
-              <a:rPr lang="en-US" sz="2400" dirty="0"/>
-              <a:t>Use NA or blank for missing values</a:t>
-            </a:r>
-          </a:p>
-          <a:p>
-            <a:pPr lvl="1"/>
-            <a:endParaRPr lang="en-US" sz="2400" dirty="0"/>
-          </a:p>
-        </p:txBody>
-      </p:sp>
-    </p:spTree>
-    <p:extLst>
-      <p:ext uri="{BB962C8B-B14F-4D97-AF65-F5344CB8AC3E}">
-        <p14:creationId xmlns:p14="http://schemas.microsoft.com/office/powerpoint/2010/main" val="664548069"/>
-      </p:ext>
-    </p:extLst>
-  </p:cSld>
-  <p:clrMapOvr>
-    <a:masterClrMapping/>
-  </p:clrMapOvr>
-</p:sld>
-</file>
-
-<file path=ppt/slides/slide23.xml><?xml version="1.0" encoding="utf-8"?>
-<p:sld xmlns:a="http://schemas.openxmlformats.org/drawingml/2006/main" xmlns:r="http://schemas.openxmlformats.org/officeDocument/2006/relationships" xmlns:p="http://schemas.openxmlformats.org/presentationml/2006/main">
-  <p:cSld>
-    <p:spTree>
-      <p:nvGrpSpPr>
-        <p:cNvPr id="1" name=""/>
-        <p:cNvGrpSpPr/>
-        <p:nvPr/>
-      </p:nvGrpSpPr>
-      <p:grpSpPr>
-        <a:xfrm>
-          <a:off x="0" y="0"/>
-          <a:ext cx="0" cy="0"/>
-          <a:chOff x="0" y="0"/>
-          <a:chExt cx="0" cy="0"/>
-        </a:xfrm>
-      </p:grpSpPr>
-      <p:sp>
-        <p:nvSpPr>
-          <p:cNvPr id="2" name="Title 1">
-            <a:extLst>
-              <a:ext uri="{FF2B5EF4-FFF2-40B4-BE49-F238E27FC236}">
-                <a16:creationId xmlns:a16="http://schemas.microsoft.com/office/drawing/2014/main" id="{32C395B9-E34E-144D-9463-8060E0DAC030}"/>
-              </a:ext>
-            </a:extLst>
-          </p:cNvPr>
-          <p:cNvSpPr>
-            <a:spLocks noGrp="1"/>
-          </p:cNvSpPr>
-          <p:nvPr>
-            <p:ph type="title"/>
-          </p:nvPr>
-        </p:nvSpPr>
-        <p:spPr/>
-        <p:txBody>
-          <a:bodyPr/>
-          <a:lstStyle/>
-          <a:p>
-            <a:r>
-              <a:rPr lang="en-US" dirty="0"/>
-              <a:t>Read in Data</a:t>
-            </a:r>
-          </a:p>
-        </p:txBody>
-      </p:sp>
-      <p:sp>
-        <p:nvSpPr>
-          <p:cNvPr id="3" name="Content Placeholder 2">
-            <a:extLst>
-              <a:ext uri="{FF2B5EF4-FFF2-40B4-BE49-F238E27FC236}">
-                <a16:creationId xmlns:a16="http://schemas.microsoft.com/office/drawing/2014/main" id="{302883FE-A885-C749-8E9E-115D59D65EF1}"/>
-              </a:ext>
-            </a:extLst>
-          </p:cNvPr>
-          <p:cNvSpPr>
-            <a:spLocks noGrp="1"/>
-          </p:cNvSpPr>
-          <p:nvPr>
-            <p:ph idx="1"/>
-          </p:nvPr>
-        </p:nvSpPr>
-        <p:spPr>
-          <a:xfrm>
-            <a:off x="457200" y="1380852"/>
-            <a:ext cx="8229600" cy="4983162"/>
-          </a:xfrm>
-        </p:spPr>
-        <p:txBody>
-          <a:bodyPr>
-            <a:normAutofit lnSpcReduction="10000"/>
-          </a:bodyPr>
-          <a:lstStyle/>
-          <a:p>
-            <a:r>
-              <a:rPr lang="en-US" sz="2400" dirty="0"/>
-              <a:t>Read in data</a:t>
-            </a:r>
-          </a:p>
-          <a:p>
-            <a:pPr lvl="1"/>
-            <a:r>
-              <a:rPr lang="en-US" sz="2400" dirty="0"/>
-              <a:t>CSV files: </a:t>
-            </a:r>
-          </a:p>
-          <a:p>
-            <a:pPr lvl="2"/>
-            <a:r>
-              <a:rPr lang="en-US" sz="2000" dirty="0" err="1"/>
-              <a:t>iris.df</a:t>
-            </a:r>
-            <a:r>
-              <a:rPr lang="en-US" sz="2000" dirty="0"/>
-              <a:t> &lt;- </a:t>
-            </a:r>
-            <a:r>
-              <a:rPr lang="en-US" sz="2000" dirty="0" err="1"/>
-              <a:t>read.csv</a:t>
-            </a:r>
-            <a:r>
-              <a:rPr lang="en-US" sz="2000" dirty="0"/>
-              <a:t>("</a:t>
-            </a:r>
-            <a:r>
-              <a:rPr lang="en-US" sz="2000" dirty="0" err="1"/>
-              <a:t>iris_df.csv</a:t>
-            </a:r>
-            <a:r>
-              <a:rPr lang="en-US" sz="2000" dirty="0"/>
-              <a:t>", header=T)</a:t>
-            </a:r>
-          </a:p>
-          <a:p>
-            <a:pPr lvl="2"/>
-            <a:r>
-              <a:rPr lang="en-US" sz="2000" dirty="0" err="1"/>
-              <a:t>Readr</a:t>
-            </a:r>
-            <a:r>
-              <a:rPr lang="en-US" sz="2000" dirty="0"/>
-              <a:t> package: </a:t>
-            </a:r>
-            <a:r>
-              <a:rPr lang="en-US" sz="2000" dirty="0" err="1"/>
-              <a:t>iris.df</a:t>
-            </a:r>
-            <a:r>
-              <a:rPr lang="en-US" sz="2000" dirty="0"/>
-              <a:t> &lt;- </a:t>
-            </a:r>
-            <a:r>
-              <a:rPr lang="en-US" sz="2000" dirty="0" err="1"/>
-              <a:t>read_csv</a:t>
-            </a:r>
-            <a:r>
-              <a:rPr lang="en-US" sz="2000" dirty="0"/>
-              <a:t>(“</a:t>
-            </a:r>
-            <a:r>
-              <a:rPr lang="en-US" sz="2000" dirty="0" err="1"/>
-              <a:t>iris_df.csv</a:t>
-            </a:r>
-            <a:r>
-              <a:rPr lang="en-US" sz="2000" dirty="0"/>
-              <a:t>”)</a:t>
-            </a:r>
-          </a:p>
-          <a:p>
-            <a:pPr lvl="1"/>
-            <a:r>
-              <a:rPr lang="en-US" sz="2400" dirty="0"/>
-              <a:t>Excel files: </a:t>
-            </a:r>
-          </a:p>
-          <a:p>
-            <a:pPr lvl="2"/>
-            <a:r>
-              <a:rPr lang="en-US" sz="2000" dirty="0"/>
-              <a:t>Use </a:t>
-            </a:r>
-            <a:r>
-              <a:rPr lang="en-US" sz="2000" dirty="0" err="1"/>
-              <a:t>readxl</a:t>
-            </a:r>
-            <a:r>
-              <a:rPr lang="en-US" sz="2000" dirty="0"/>
-              <a:t>() function. Part of </a:t>
-            </a:r>
-            <a:r>
-              <a:rPr lang="en-US" sz="2000" dirty="0" err="1"/>
-              <a:t>tidyverse</a:t>
-            </a:r>
-            <a:r>
-              <a:rPr lang="en-US" sz="2000" dirty="0"/>
-              <a:t>. </a:t>
-            </a:r>
-          </a:p>
-          <a:p>
-            <a:pPr lvl="3"/>
-            <a:r>
-              <a:rPr lang="en-US" sz="1600" dirty="0" err="1"/>
-              <a:t>read_excel</a:t>
-            </a:r>
-            <a:r>
-              <a:rPr lang="en-US" sz="1600" dirty="0"/>
-              <a:t>() reads both </a:t>
-            </a:r>
-            <a:r>
-              <a:rPr lang="en-US" sz="1600" dirty="0" err="1"/>
-              <a:t>xls</a:t>
-            </a:r>
-            <a:r>
-              <a:rPr lang="en-US" sz="1600" dirty="0"/>
-              <a:t> and xlsx files</a:t>
-            </a:r>
-          </a:p>
-          <a:p>
-            <a:pPr lvl="3"/>
-            <a:r>
-              <a:rPr lang="en-US" sz="1600" dirty="0" err="1"/>
-              <a:t>read_excel</a:t>
-            </a:r>
-            <a:r>
-              <a:rPr lang="en-US" sz="1600" dirty="0"/>
-              <a:t>(“</a:t>
-            </a:r>
-            <a:r>
-              <a:rPr lang="en-US" sz="1600" dirty="0" err="1"/>
-              <a:t>dataset.xlsx</a:t>
-            </a:r>
-            <a:r>
-              <a:rPr lang="en-US" sz="1600" dirty="0"/>
-              <a:t>”, sheet = 2, </a:t>
-            </a:r>
-            <a:r>
-              <a:rPr lang="en-US" sz="1600" dirty="0" err="1"/>
-              <a:t>col_names</a:t>
-            </a:r>
-            <a:r>
-              <a:rPr lang="en-US" sz="1600" dirty="0"/>
-              <a:t>=c(“a”, “b”))</a:t>
-            </a:r>
-          </a:p>
-          <a:p>
-            <a:pPr lvl="2"/>
-            <a:r>
-              <a:rPr lang="en-US" sz="2000" dirty="0"/>
-              <a:t>Other options include ‘xlsx’ and ‘</a:t>
-            </a:r>
-            <a:r>
-              <a:rPr lang="en-US" sz="2000" dirty="0" err="1"/>
-              <a:t>XLConnect</a:t>
-            </a:r>
-            <a:r>
-              <a:rPr lang="en-US" sz="2000" dirty="0"/>
-              <a:t>’ packages</a:t>
-            </a:r>
-          </a:p>
-          <a:p>
-            <a:r>
-              <a:rPr lang="en-US" sz="2800" dirty="0"/>
-              <a:t>R Studio Trick: </a:t>
-            </a:r>
-          </a:p>
-          <a:p>
-            <a:pPr lvl="1"/>
-            <a:r>
-              <a:rPr lang="en-US" sz="2400" dirty="0"/>
-              <a:t>use “import dataset” tool, or navigate to the location of your datafile and click on it and choose “import dataset”</a:t>
-            </a:r>
-          </a:p>
-          <a:p>
-            <a:pPr lvl="1"/>
-            <a:r>
-              <a:rPr lang="en-US" sz="2400" dirty="0"/>
-              <a:t>follow directions on the pop-up box</a:t>
-            </a:r>
-          </a:p>
-          <a:p>
-            <a:pPr lvl="1"/>
-            <a:r>
-              <a:rPr lang="en-US" sz="2400" dirty="0"/>
-              <a:t>copy the code that runs in your console into your script</a:t>
-            </a:r>
-          </a:p>
-          <a:p>
-            <a:endParaRPr lang="en-US" dirty="0"/>
-          </a:p>
-        </p:txBody>
-      </p:sp>
-    </p:spTree>
-    <p:extLst>
-      <p:ext uri="{BB962C8B-B14F-4D97-AF65-F5344CB8AC3E}">
-        <p14:creationId xmlns:p14="http://schemas.microsoft.com/office/powerpoint/2010/main" val="3700188996"/>
-      </p:ext>
-    </p:extLst>
-  </p:cSld>
-  <p:clrMapOvr>
-    <a:masterClrMapping/>
-  </p:clrMapOvr>
-</p:sld>
-</file>
-
-<file path=ppt/slides/slide24.xml><?xml version="1.0" encoding="utf-8"?>
-<p:sld xmlns:a="http://schemas.openxmlformats.org/drawingml/2006/main" xmlns:r="http://schemas.openxmlformats.org/officeDocument/2006/relationships" xmlns:p="http://schemas.openxmlformats.org/presentationml/2006/main">
-  <p:cSld>
-    <p:spTree>
-      <p:nvGrpSpPr>
-        <p:cNvPr id="1" name=""/>
-        <p:cNvGrpSpPr/>
-        <p:nvPr/>
-      </p:nvGrpSpPr>
-      <p:grpSpPr>
-        <a:xfrm>
-          <a:off x="0" y="0"/>
-          <a:ext cx="0" cy="0"/>
-          <a:chOff x="0" y="0"/>
-          <a:chExt cx="0" cy="0"/>
-        </a:xfrm>
-      </p:grpSpPr>
-      <p:sp>
-        <p:nvSpPr>
-          <p:cNvPr id="2" name="Title 1"/>
-          <p:cNvSpPr>
-            <a:spLocks noGrp="1"/>
-          </p:cNvSpPr>
-          <p:nvPr>
-            <p:ph type="title"/>
-          </p:nvPr>
-        </p:nvSpPr>
-        <p:spPr/>
-        <p:txBody>
-          <a:bodyPr/>
-          <a:lstStyle/>
-          <a:p>
-            <a:r>
-              <a:rPr lang="en-US" dirty="0"/>
-              <a:t>Exploring dataframes</a:t>
-            </a:r>
-          </a:p>
-        </p:txBody>
-      </p:sp>
-      <p:sp>
-        <p:nvSpPr>
-          <p:cNvPr id="3" name="Content Placeholder 2"/>
-          <p:cNvSpPr>
-            <a:spLocks noGrp="1"/>
-          </p:cNvSpPr>
-          <p:nvPr>
-            <p:ph idx="1"/>
-          </p:nvPr>
-        </p:nvSpPr>
-        <p:spPr>
-          <a:xfrm>
-            <a:off x="457200" y="1600200"/>
-            <a:ext cx="8229600" cy="4572000"/>
-          </a:xfrm>
-        </p:spPr>
-        <p:txBody>
-          <a:bodyPr>
-            <a:normAutofit fontScale="77500" lnSpcReduction="20000"/>
-          </a:bodyPr>
-          <a:lstStyle/>
-          <a:p>
-            <a:r>
-              <a:rPr lang="en-US" dirty="0"/>
-              <a:t>str(dataframe) -  column classes and dimensions</a:t>
-            </a:r>
-          </a:p>
-          <a:p>
-            <a:r>
-              <a:rPr lang="en-US" dirty="0"/>
-              <a:t>head(dataframe) and tail() - first and last 6 rows</a:t>
-            </a:r>
-          </a:p>
-          <a:p>
-            <a:r>
-              <a:rPr lang="en-US" dirty="0" err="1"/>
-              <a:t>names(dataframe</a:t>
-            </a:r>
-            <a:r>
-              <a:rPr lang="en-US" dirty="0"/>
-              <a:t>) - column names</a:t>
-            </a:r>
-          </a:p>
-          <a:p>
-            <a:r>
-              <a:rPr lang="en-US" dirty="0"/>
-              <a:t>row.names(dataframe) - row names</a:t>
-            </a:r>
-          </a:p>
-          <a:p>
-            <a:r>
-              <a:rPr lang="en-US" dirty="0"/>
-              <a:t>attributes(dataframe) - column and row names and object class</a:t>
-            </a:r>
-          </a:p>
-          <a:p>
-            <a:r>
-              <a:rPr lang="en-US" dirty="0" err="1"/>
-              <a:t>summary(dataframe</a:t>
-            </a:r>
-            <a:r>
-              <a:rPr lang="en-US" dirty="0"/>
-              <a:t>) – gives a lot of good information</a:t>
-            </a:r>
-          </a:p>
-          <a:p>
-            <a:pPr lvl="1"/>
-            <a:r>
-              <a:rPr lang="en-US" dirty="0"/>
-              <a:t>Make sure variables are appropriate class</a:t>
-            </a:r>
-          </a:p>
-          <a:p>
-            <a:pPr lvl="2"/>
-            <a:r>
-              <a:rPr lang="en-US" dirty="0"/>
-              <a:t>Character/string, Numeric, Factor, Integer, logical</a:t>
-            </a:r>
-          </a:p>
-          <a:p>
-            <a:pPr lvl="1"/>
-            <a:r>
-              <a:rPr lang="en-US" dirty="0"/>
-              <a:t>Make sure </a:t>
-            </a:r>
-            <a:r>
-              <a:rPr lang="en-US" dirty="0" err="1"/>
-              <a:t>mins</a:t>
-            </a:r>
-            <a:r>
-              <a:rPr lang="en-US" dirty="0"/>
-              <a:t>, </a:t>
-            </a:r>
-            <a:r>
-              <a:rPr lang="en-US" dirty="0" err="1"/>
-              <a:t>maxs</a:t>
-            </a:r>
-            <a:r>
-              <a:rPr lang="en-US" dirty="0"/>
-              <a:t>, means, etc. seem right</a:t>
-            </a:r>
-          </a:p>
-          <a:p>
-            <a:pPr lvl="1"/>
-            <a:r>
-              <a:rPr lang="en-US" dirty="0"/>
-              <a:t>Make sure you don’t have typing errors so Premna and </a:t>
-            </a:r>
-            <a:r>
-              <a:rPr lang="en-US" dirty="0" err="1"/>
-              <a:t>premna</a:t>
-            </a:r>
-            <a:r>
-              <a:rPr lang="en-US" dirty="0"/>
-              <a:t> are two separate factors</a:t>
-            </a:r>
-          </a:p>
-          <a:p>
-            <a:r>
-              <a:rPr lang="en-US" dirty="0"/>
-              <a:t>Use: unique(</a:t>
-            </a:r>
-            <a:r>
-              <a:rPr lang="en-US" dirty="0" err="1"/>
-              <a:t>spider$species</a:t>
-            </a:r>
-            <a:r>
-              <a:rPr lang="en-US" dirty="0"/>
-              <a:t>) to see what all unique values of a column are</a:t>
-            </a:r>
-          </a:p>
-          <a:p>
-            <a:r>
-              <a:rPr lang="en-US" dirty="0"/>
-              <a:t>Or use: levels(</a:t>
-            </a:r>
-            <a:r>
-              <a:rPr lang="en-US" dirty="0" err="1"/>
-              <a:t>spider$species</a:t>
-            </a:r>
-            <a:r>
-              <a:rPr lang="en-US" dirty="0"/>
-              <a:t>) to see different levels</a:t>
-            </a:r>
-          </a:p>
-        </p:txBody>
-      </p:sp>
-    </p:spTree>
-    <p:extLst>
-      <p:ext uri="{BB962C8B-B14F-4D97-AF65-F5344CB8AC3E}">
-        <p14:creationId xmlns:p14="http://schemas.microsoft.com/office/powerpoint/2010/main" val="3414467041"/>
-      </p:ext>
-    </p:extLst>
-  </p:cSld>
-  <p:clrMapOvr>
-    <a:masterClrMapping/>
-  </p:clrMapOvr>
-  <p:timing>
-    <p:tnLst>
-      <p:par>
-        <p:cTn id="1" dur="indefinite" restart="never" nodeType="tmRoot">
-          <p:childTnLst>
-            <p:seq concurrent="1" nextAc="seek">
-              <p:cTn id="2" dur="indefinite" nodeType="mainSeq">
-                <p:childTnLst>
-                  <p:par>
-                    <p:cTn id="3" fill="hold">
-                      <p:stCondLst>
-                        <p:cond delay="indefinite"/>
-                      </p:stCondLst>
-                      <p:childTnLst>
-                        <p:par>
-                          <p:cTn id="4" fill="hold">
-                            <p:stCondLst>
-                              <p:cond delay="0"/>
-                            </p:stCondLst>
-                            <p:childTnLst>
-                              <p:par>
-                                <p:cTn id="5" presetID="1" presetClass="entr" presetSubtype="0" fill="hold" grpId="0" nodeType="clickEffect">
-                                  <p:stCondLst>
-                                    <p:cond delay="0"/>
-                                  </p:stCondLst>
-                                  <p:childTnLst>
-                                    <p:set>
-                                      <p:cBhvr>
-                                        <p:cTn id="6" dur="1" fill="hold">
-                                          <p:stCondLst>
-                                            <p:cond delay="0"/>
-                                          </p:stCondLst>
-                                        </p:cTn>
-                                        <p:tgtEl>
-                                          <p:spTgt spid="3">
-                                            <p:txEl>
-                                              <p:pRg st="0" end="0"/>
-                                            </p:txEl>
-                                          </p:spTgt>
-                                        </p:tgtEl>
-                                        <p:attrNameLst>
-                                          <p:attrName>style.visibility</p:attrName>
-                                        </p:attrNameLst>
-                                      </p:cBhvr>
-                                      <p:to>
-                                        <p:strVal val="visible"/>
-                                      </p:to>
-                                    </p:set>
-                                  </p:childTnLst>
-                                </p:cTn>
-                              </p:par>
-                            </p:childTnLst>
-                          </p:cTn>
-                        </p:par>
-                      </p:childTnLst>
-                    </p:cTn>
-                  </p:par>
-                  <p:par>
-                    <p:cTn id="7" fill="hold">
-                      <p:stCondLst>
-                        <p:cond delay="indefinite"/>
-                      </p:stCondLst>
-                      <p:childTnLst>
-                        <p:par>
-                          <p:cTn id="8" fill="hold">
-                            <p:stCondLst>
-                              <p:cond delay="0"/>
-                            </p:stCondLst>
-                            <p:childTnLst>
-                              <p:par>
-                                <p:cTn id="9" presetID="1" presetClass="entr" presetSubtype="0" fill="hold" grpId="0" nodeType="clickEffect">
-                                  <p:stCondLst>
-                                    <p:cond delay="0"/>
-                                  </p:stCondLst>
-                                  <p:childTnLst>
-                                    <p:set>
-                                      <p:cBhvr>
-                                        <p:cTn id="10" dur="1" fill="hold">
-                                          <p:stCondLst>
-                                            <p:cond delay="0"/>
-                                          </p:stCondLst>
-                                        </p:cTn>
-                                        <p:tgtEl>
-                                          <p:spTgt spid="3">
-                                            <p:txEl>
-                                              <p:pRg st="1" end="1"/>
-                                            </p:txEl>
-                                          </p:spTgt>
-                                        </p:tgtEl>
-                                        <p:attrNameLst>
-                                          <p:attrName>style.visibility</p:attrName>
-                                        </p:attrNameLst>
-                                      </p:cBhvr>
-                                      <p:to>
-                                        <p:strVal val="visible"/>
-                                      </p:to>
-                                    </p:set>
-                                  </p:childTnLst>
-                                </p:cTn>
-                              </p:par>
-                            </p:childTnLst>
-                          </p:cTn>
-                        </p:par>
-                      </p:childTnLst>
-                    </p:cTn>
-                  </p:par>
-                  <p:par>
-                    <p:cTn id="11" fill="hold">
-                      <p:stCondLst>
-                        <p:cond delay="indefinite"/>
-                      </p:stCondLst>
-                      <p:childTnLst>
-                        <p:par>
-                          <p:cTn id="12" fill="hold">
-                            <p:stCondLst>
-                              <p:cond delay="0"/>
-                            </p:stCondLst>
-                            <p:childTnLst>
-                              <p:par>
-                                <p:cTn id="13" presetID="1" presetClass="entr" presetSubtype="0" fill="hold" grpId="0" nodeType="clickEffect">
-                                  <p:stCondLst>
-                                    <p:cond delay="0"/>
-                                  </p:stCondLst>
-                                  <p:childTnLst>
-                                    <p:set>
-                                      <p:cBhvr>
-                                        <p:cTn id="14" dur="1" fill="hold">
-                                          <p:stCondLst>
-                                            <p:cond delay="0"/>
-                                          </p:stCondLst>
-                                        </p:cTn>
-                                        <p:tgtEl>
-                                          <p:spTgt spid="3">
-                                            <p:txEl>
-                                              <p:pRg st="2" end="2"/>
-                                            </p:txEl>
-                                          </p:spTgt>
-                                        </p:tgtEl>
-                                        <p:attrNameLst>
-                                          <p:attrName>style.visibility</p:attrName>
-                                        </p:attrNameLst>
-                                      </p:cBhvr>
-                                      <p:to>
-                                        <p:strVal val="visible"/>
-                                      </p:to>
-                                    </p:set>
-                                  </p:childTnLst>
-                                </p:cTn>
-                              </p:par>
-                            </p:childTnLst>
-                          </p:cTn>
-                        </p:par>
-                      </p:childTnLst>
-                    </p:cTn>
-                  </p:par>
-                  <p:par>
-                    <p:cTn id="15" fill="hold">
-                      <p:stCondLst>
-                        <p:cond delay="indefinite"/>
-                      </p:stCondLst>
-                      <p:childTnLst>
-                        <p:par>
-                          <p:cTn id="16" fill="hold">
-                            <p:stCondLst>
-                              <p:cond delay="0"/>
-                            </p:stCondLst>
-                            <p:childTnLst>
-                              <p:par>
-                                <p:cTn id="17" presetID="1" presetClass="entr" presetSubtype="0" fill="hold" grpId="0" nodeType="clickEffect">
-                                  <p:stCondLst>
-                                    <p:cond delay="0"/>
-                                  </p:stCondLst>
-                                  <p:childTnLst>
-                                    <p:set>
-                                      <p:cBhvr>
-                                        <p:cTn id="18" dur="1" fill="hold">
-                                          <p:stCondLst>
-                                            <p:cond delay="0"/>
-                                          </p:stCondLst>
-                                        </p:cTn>
-                                        <p:tgtEl>
-                                          <p:spTgt spid="3">
-                                            <p:txEl>
-                                              <p:pRg st="3" end="3"/>
-                                            </p:txEl>
-                                          </p:spTgt>
-                                        </p:tgtEl>
-                                        <p:attrNameLst>
-                                          <p:attrName>style.visibility</p:attrName>
-                                        </p:attrNameLst>
-                                      </p:cBhvr>
-                                      <p:to>
-                                        <p:strVal val="visible"/>
-                                      </p:to>
-                                    </p:set>
-                                  </p:childTnLst>
-                                </p:cTn>
-                              </p:par>
-                            </p:childTnLst>
-                          </p:cTn>
-                        </p:par>
-                      </p:childTnLst>
-                    </p:cTn>
-                  </p:par>
-                  <p:par>
-                    <p:cTn id="19" fill="hold">
-                      <p:stCondLst>
-                        <p:cond delay="indefinite"/>
-                      </p:stCondLst>
-                      <p:childTnLst>
-                        <p:par>
-                          <p:cTn id="20" fill="hold">
-                            <p:stCondLst>
-                              <p:cond delay="0"/>
-                            </p:stCondLst>
-                            <p:childTnLst>
-                              <p:par>
-                                <p:cTn id="21" presetID="1" presetClass="entr" presetSubtype="0" fill="hold" grpId="0" nodeType="clickEffect">
-                                  <p:stCondLst>
-                                    <p:cond delay="0"/>
-                                  </p:stCondLst>
-                                  <p:childTnLst>
-                                    <p:set>
-                                      <p:cBhvr>
-                                        <p:cTn id="22" dur="1" fill="hold">
-                                          <p:stCondLst>
-                                            <p:cond delay="0"/>
-                                          </p:stCondLst>
-                                        </p:cTn>
-                                        <p:tgtEl>
-                                          <p:spTgt spid="3">
-                                            <p:txEl>
-                                              <p:pRg st="4" end="4"/>
-                                            </p:txEl>
-                                          </p:spTgt>
-                                        </p:tgtEl>
-                                        <p:attrNameLst>
-                                          <p:attrName>style.visibility</p:attrName>
-                                        </p:attrNameLst>
-                                      </p:cBhvr>
-                                      <p:to>
-                                        <p:strVal val="visible"/>
-                                      </p:to>
-                                    </p:set>
-                                  </p:childTnLst>
-                                </p:cTn>
-                              </p:par>
-                            </p:childTnLst>
-                          </p:cTn>
-                        </p:par>
-                      </p:childTnLst>
-                    </p:cTn>
-                  </p:par>
-                  <p:par>
-                    <p:cTn id="23" fill="hold">
-                      <p:stCondLst>
-                        <p:cond delay="indefinite"/>
-                      </p:stCondLst>
-                      <p:childTnLst>
-                        <p:par>
-                          <p:cTn id="24" fill="hold">
-                            <p:stCondLst>
-                              <p:cond delay="0"/>
-                            </p:stCondLst>
-                            <p:childTnLst>
-                              <p:par>
-                                <p:cTn id="25" presetID="1" presetClass="entr" presetSubtype="0" fill="hold" grpId="0" nodeType="clickEffect">
-                                  <p:stCondLst>
-                                    <p:cond delay="0"/>
-                                  </p:stCondLst>
-                                  <p:childTnLst>
-                                    <p:set>
-                                      <p:cBhvr>
-                                        <p:cTn id="26" dur="1" fill="hold">
-                                          <p:stCondLst>
-                                            <p:cond delay="0"/>
-                                          </p:stCondLst>
-                                        </p:cTn>
-                                        <p:tgtEl>
-                                          <p:spTgt spid="3">
-                                            <p:txEl>
-                                              <p:pRg st="5" end="5"/>
-                                            </p:txEl>
-                                          </p:spTgt>
-                                        </p:tgtEl>
-                                        <p:attrNameLst>
-                                          <p:attrName>style.visibility</p:attrName>
-                                        </p:attrNameLst>
-                                      </p:cBhvr>
-                                      <p:to>
-                                        <p:strVal val="visible"/>
-                                      </p:to>
-                                    </p:set>
-                                  </p:childTnLst>
-                                </p:cTn>
-                              </p:par>
-                              <p:par>
-                                <p:cTn id="27" presetID="1" presetClass="entr" presetSubtype="0" fill="hold" grpId="0" nodeType="withEffect">
-                                  <p:stCondLst>
-                                    <p:cond delay="0"/>
-                                  </p:stCondLst>
-                                  <p:childTnLst>
-                                    <p:set>
-                                      <p:cBhvr>
-                                        <p:cTn id="28" dur="1" fill="hold">
-                                          <p:stCondLst>
-                                            <p:cond delay="0"/>
-                                          </p:stCondLst>
-                                        </p:cTn>
-                                        <p:tgtEl>
-                                          <p:spTgt spid="3">
-                                            <p:txEl>
-                                              <p:pRg st="6" end="6"/>
-                                            </p:txEl>
-                                          </p:spTgt>
-                                        </p:tgtEl>
-                                        <p:attrNameLst>
-                                          <p:attrName>style.visibility</p:attrName>
-                                        </p:attrNameLst>
-                                      </p:cBhvr>
-                                      <p:to>
-                                        <p:strVal val="visible"/>
-                                      </p:to>
-                                    </p:set>
-                                  </p:childTnLst>
-                                </p:cTn>
-                              </p:par>
-                              <p:par>
-                                <p:cTn id="29" presetID="1" presetClass="entr" presetSubtype="0" fill="hold" grpId="0" nodeType="withEffect">
-                                  <p:stCondLst>
-                                    <p:cond delay="0"/>
-                                  </p:stCondLst>
-                                  <p:childTnLst>
-                                    <p:set>
-                                      <p:cBhvr>
-                                        <p:cTn id="30" dur="1" fill="hold">
-                                          <p:stCondLst>
-                                            <p:cond delay="0"/>
-                                          </p:stCondLst>
-                                        </p:cTn>
-                                        <p:tgtEl>
-                                          <p:spTgt spid="3">
-                                            <p:txEl>
-                                              <p:pRg st="7" end="7"/>
-                                            </p:txEl>
-                                          </p:spTgt>
-                                        </p:tgtEl>
-                                        <p:attrNameLst>
-                                          <p:attrName>style.visibility</p:attrName>
-                                        </p:attrNameLst>
-                                      </p:cBhvr>
-                                      <p:to>
-                                        <p:strVal val="visible"/>
-                                      </p:to>
-                                    </p:set>
-                                  </p:childTnLst>
-                                </p:cTn>
-                              </p:par>
-                              <p:par>
-                                <p:cTn id="31" presetID="1" presetClass="entr" presetSubtype="0" fill="hold" grpId="0" nodeType="withEffect">
-                                  <p:stCondLst>
-                                    <p:cond delay="0"/>
-                                  </p:stCondLst>
-                                  <p:childTnLst>
-                                    <p:set>
-                                      <p:cBhvr>
-                                        <p:cTn id="32" dur="1" fill="hold">
-                                          <p:stCondLst>
-                                            <p:cond delay="0"/>
-                                          </p:stCondLst>
-                                        </p:cTn>
-                                        <p:tgtEl>
-                                          <p:spTgt spid="3">
-                                            <p:txEl>
-                                              <p:pRg st="8" end="8"/>
-                                            </p:txEl>
-                                          </p:spTgt>
-                                        </p:tgtEl>
-                                        <p:attrNameLst>
-                                          <p:attrName>style.visibility</p:attrName>
-                                        </p:attrNameLst>
-                                      </p:cBhvr>
-                                      <p:to>
-                                        <p:strVal val="visible"/>
-                                      </p:to>
-                                    </p:set>
-                                  </p:childTnLst>
-                                </p:cTn>
-                              </p:par>
-                              <p:par>
-                                <p:cTn id="33" presetID="1" presetClass="entr" presetSubtype="0" fill="hold" grpId="0" nodeType="withEffect">
-                                  <p:stCondLst>
-                                    <p:cond delay="0"/>
-                                  </p:stCondLst>
-                                  <p:childTnLst>
-                                    <p:set>
-                                      <p:cBhvr>
-                                        <p:cTn id="34" dur="1" fill="hold">
-                                          <p:stCondLst>
-                                            <p:cond delay="0"/>
-                                          </p:stCondLst>
-                                        </p:cTn>
-                                        <p:tgtEl>
-                                          <p:spTgt spid="3">
-                                            <p:txEl>
-                                              <p:pRg st="9" end="9"/>
-                                            </p:txEl>
-                                          </p:spTgt>
-                                        </p:tgtEl>
-                                        <p:attrNameLst>
-                                          <p:attrName>style.visibility</p:attrName>
-                                        </p:attrNameLst>
-                                      </p:cBhvr>
-                                      <p:to>
-                                        <p:strVal val="visible"/>
-                                      </p:to>
-                                    </p:set>
-                                  </p:childTnLst>
-                                </p:cTn>
-                              </p:par>
-                            </p:childTnLst>
-                          </p:cTn>
-                        </p:par>
-                      </p:childTnLst>
-                    </p:cTn>
-                  </p:par>
-                  <p:par>
-                    <p:cTn id="35" fill="hold">
-                      <p:stCondLst>
-                        <p:cond delay="indefinite"/>
-                      </p:stCondLst>
-                      <p:childTnLst>
-                        <p:par>
-                          <p:cTn id="36" fill="hold">
-                            <p:stCondLst>
-                              <p:cond delay="0"/>
-                            </p:stCondLst>
-                            <p:childTnLst>
-                              <p:par>
-                                <p:cTn id="37" presetID="1" presetClass="entr" presetSubtype="0" fill="hold" grpId="0" nodeType="clickEffect">
-                                  <p:stCondLst>
-                                    <p:cond delay="0"/>
-                                  </p:stCondLst>
-                                  <p:childTnLst>
-                                    <p:set>
-                                      <p:cBhvr>
-                                        <p:cTn id="38" dur="1" fill="hold">
-                                          <p:stCondLst>
-                                            <p:cond delay="0"/>
-                                          </p:stCondLst>
-                                        </p:cTn>
-                                        <p:tgtEl>
-                                          <p:spTgt spid="3">
-                                            <p:txEl>
-                                              <p:pRg st="10" end="10"/>
-                                            </p:txEl>
-                                          </p:spTgt>
-                                        </p:tgtEl>
-                                        <p:attrNameLst>
-                                          <p:attrName>style.visibility</p:attrName>
-                                        </p:attrNameLst>
-                                      </p:cBhvr>
-                                      <p:to>
-                                        <p:strVal val="visible"/>
-                                      </p:to>
-                                    </p:set>
-                                  </p:childTnLst>
-                                </p:cTn>
-                              </p:par>
-                            </p:childTnLst>
-                          </p:cTn>
-                        </p:par>
-                      </p:childTnLst>
-                    </p:cTn>
-                  </p:par>
-                  <p:par>
-                    <p:cTn id="39" fill="hold">
-                      <p:stCondLst>
-                        <p:cond delay="indefinite"/>
-                      </p:stCondLst>
-                      <p:childTnLst>
-                        <p:par>
-                          <p:cTn id="40" fill="hold">
-                            <p:stCondLst>
-                              <p:cond delay="0"/>
-                            </p:stCondLst>
-                            <p:childTnLst>
-                              <p:par>
-                                <p:cTn id="41" presetID="1" presetClass="entr" presetSubtype="0" fill="hold" grpId="0" nodeType="clickEffect">
-                                  <p:stCondLst>
-                                    <p:cond delay="0"/>
-                                  </p:stCondLst>
-                                  <p:childTnLst>
-                                    <p:set>
-                                      <p:cBhvr>
-                                        <p:cTn id="42" dur="1" fill="hold">
-                                          <p:stCondLst>
-                                            <p:cond delay="0"/>
-                                          </p:stCondLst>
-                                        </p:cTn>
-                                        <p:tgtEl>
-                                          <p:spTgt spid="3">
-                                            <p:txEl>
-                                              <p:pRg st="11" end="11"/>
-                                            </p:txEl>
-                                          </p:spTgt>
-                                        </p:tgtEl>
-                                        <p:attrNameLst>
-                                          <p:attrName>style.visibility</p:attrName>
-                                        </p:attrNameLst>
-                                      </p:cBhvr>
-                                      <p:to>
-                                        <p:strVal val="visible"/>
-                                      </p:to>
-                                    </p:set>
-                                  </p:childTnLst>
-                                </p:cTn>
-                              </p:par>
-                            </p:childTnLst>
-                          </p:cTn>
-                        </p:par>
-                      </p:childTnLst>
-                    </p:cTn>
-                  </p:par>
-                </p:childTnLst>
-              </p:cTn>
-              <p:prevCondLst>
-                <p:cond evt="onPrev" delay="0">
-                  <p:tgtEl>
-                    <p:sldTgt/>
-                  </p:tgtEl>
-                </p:cond>
-              </p:prevCondLst>
-              <p:nextCondLst>
-                <p:cond evt="onNext" delay="0">
-                  <p:tgtEl>
-                    <p:sldTgt/>
-                  </p:tgtEl>
-                </p:cond>
-              </p:nextCondLst>
-            </p:seq>
-          </p:childTnLst>
-        </p:cTn>
-      </p:par>
-    </p:tnLst>
-    <p:bldLst>
-      <p:bldP spid="3" grpId="0" build="p"/>
-    </p:bldLst>
-  </p:timing>
 </p:sld>
 </file>
 
@@ -6730,7 +3890,13 @@
       </p:grpSpPr>
       <p:sp>
         <p:nvSpPr>
-          <p:cNvPr id="2" name="Title 1"/>
+          <p:cNvPr id="2" name="Title 1">
+            <a:extLst>
+              <a:ext uri="{FF2B5EF4-FFF2-40B4-BE49-F238E27FC236}">
+                <a16:creationId xmlns:a16="http://schemas.microsoft.com/office/drawing/2014/main" id="{8C262DFF-DFAA-2145-B70F-CA5A38978AB7}"/>
+              </a:ext>
+            </a:extLst>
+          </p:cNvPr>
           <p:cNvSpPr>
             <a:spLocks noGrp="1"/>
           </p:cNvSpPr>
@@ -6745,14 +3911,20 @@
           <a:p>
             <a:r>
               <a:rPr lang="en-US" dirty="0"/>
-              <a:t>1. Designing good datasheets</a:t>
-            </a:r>
-          </a:p>
-        </p:txBody>
-      </p:sp>
-      <p:sp>
-        <p:nvSpPr>
-          <p:cNvPr id="3" name="Content Placeholder 2"/>
+              <a:t>1. Read in data</a:t>
+            </a:r>
+          </a:p>
+        </p:txBody>
+      </p:sp>
+      <p:sp>
+        <p:nvSpPr>
+          <p:cNvPr id="3" name="Content Placeholder 2">
+            <a:extLst>
+              <a:ext uri="{FF2B5EF4-FFF2-40B4-BE49-F238E27FC236}">
+                <a16:creationId xmlns:a16="http://schemas.microsoft.com/office/drawing/2014/main" id="{CDCC04A1-B0D6-E043-AA7A-BD151ED470FD}"/>
+              </a:ext>
+            </a:extLst>
+          </p:cNvPr>
           <p:cNvSpPr>
             <a:spLocks noGrp="1"/>
           </p:cNvSpPr>
@@ -6760,28 +3932,204 @@
             <p:ph idx="1"/>
           </p:nvPr>
         </p:nvSpPr>
-        <p:spPr/>
-        <p:txBody>
-          <a:bodyPr/>
-          <a:lstStyle/>
-          <a:p>
-            <a:r>
-              <a:rPr lang="en-US" dirty="0"/>
-              <a:t>Look at these sample datasheets </a:t>
+        <p:spPr>
+          <a:xfrm>
+            <a:off x="628650" y="1460499"/>
+            <a:ext cx="7886700" cy="5032375"/>
+          </a:xfrm>
+        </p:spPr>
+        <p:txBody>
+          <a:bodyPr>
+            <a:normAutofit fontScale="92500" lnSpcReduction="10000"/>
+          </a:bodyPr>
+          <a:lstStyle/>
+          <a:p>
+            <a:r>
+              <a:rPr lang="en-US" sz="2400" dirty="0"/>
+              <a:t>Read in data</a:t>
             </a:r>
           </a:p>
           <a:p>
             <a:pPr lvl="1"/>
             <a:r>
               <a:rPr lang="en-US" dirty="0"/>
-              <a:t>What is good about it? </a:t>
+              <a:t>CSV files: </a:t>
+            </a:r>
+          </a:p>
+          <a:p>
+            <a:pPr lvl="2"/>
+            <a:r>
+              <a:rPr lang="en-US" dirty="0" err="1"/>
+              <a:t>iris.df</a:t>
+            </a:r>
+            <a:r>
+              <a:rPr lang="en-US" dirty="0"/>
+              <a:t> &lt;- </a:t>
+            </a:r>
+            <a:r>
+              <a:rPr lang="en-US" dirty="0" err="1"/>
+              <a:t>read.csv</a:t>
+            </a:r>
+            <a:r>
+              <a:rPr lang="en-US" dirty="0"/>
+              <a:t>("</a:t>
+            </a:r>
+            <a:r>
+              <a:rPr lang="en-US" dirty="0" err="1"/>
+              <a:t>iris_df.csv</a:t>
+            </a:r>
+            <a:r>
+              <a:rPr lang="en-US" dirty="0"/>
+              <a:t>")</a:t>
+            </a:r>
+          </a:p>
+          <a:p>
+            <a:pPr lvl="2"/>
+            <a:r>
+              <a:rPr lang="en-US" dirty="0" err="1"/>
+              <a:t>Readr</a:t>
+            </a:r>
+            <a:r>
+              <a:rPr lang="en-US" dirty="0"/>
+              <a:t> package: </a:t>
+            </a:r>
+            <a:r>
+              <a:rPr lang="en-US" dirty="0" err="1"/>
+              <a:t>iris.df</a:t>
+            </a:r>
+            <a:r>
+              <a:rPr lang="en-US" dirty="0"/>
+              <a:t> &lt;- </a:t>
+            </a:r>
+            <a:r>
+              <a:rPr lang="en-US" dirty="0" err="1"/>
+              <a:t>read_csv</a:t>
+            </a:r>
+            <a:r>
+              <a:rPr lang="en-US" dirty="0"/>
+              <a:t>(“</a:t>
+            </a:r>
+            <a:r>
+              <a:rPr lang="en-US" dirty="0" err="1"/>
+              <a:t>iris_df.csv</a:t>
+            </a:r>
+            <a:r>
+              <a:rPr lang="en-US" dirty="0"/>
+              <a:t>”)</a:t>
             </a:r>
           </a:p>
           <a:p>
             <a:pPr lvl="1"/>
             <a:r>
               <a:rPr lang="en-US" dirty="0"/>
-              <a:t>What would you change? </a:t>
+              <a:t>Excel files: </a:t>
+            </a:r>
+          </a:p>
+          <a:p>
+            <a:pPr lvl="2"/>
+            <a:r>
+              <a:rPr lang="en-US" dirty="0"/>
+              <a:t>Use </a:t>
+            </a:r>
+            <a:r>
+              <a:rPr lang="en-US" dirty="0" err="1"/>
+              <a:t>readxl</a:t>
+            </a:r>
+            <a:r>
+              <a:rPr lang="en-US" dirty="0"/>
+              <a:t>() function. Part of </a:t>
+            </a:r>
+            <a:r>
+              <a:rPr lang="en-US" dirty="0" err="1"/>
+              <a:t>tidyverse</a:t>
+            </a:r>
+            <a:r>
+              <a:rPr lang="en-US" dirty="0"/>
+              <a:t>. </a:t>
+            </a:r>
+          </a:p>
+          <a:p>
+            <a:pPr lvl="3"/>
+            <a:r>
+              <a:rPr lang="en-US" sz="1600" dirty="0" err="1"/>
+              <a:t>read_excel</a:t>
+            </a:r>
+            <a:r>
+              <a:rPr lang="en-US" sz="1600" dirty="0"/>
+              <a:t>() reads both </a:t>
+            </a:r>
+            <a:r>
+              <a:rPr lang="en-US" sz="1600" dirty="0" err="1"/>
+              <a:t>xls</a:t>
+            </a:r>
+            <a:r>
+              <a:rPr lang="en-US" sz="1600" dirty="0"/>
+              <a:t> and xlsx files</a:t>
+            </a:r>
+          </a:p>
+          <a:p>
+            <a:pPr lvl="3"/>
+            <a:r>
+              <a:rPr lang="en-US" sz="1600" dirty="0" err="1"/>
+              <a:t>read_excel</a:t>
+            </a:r>
+            <a:r>
+              <a:rPr lang="en-US" sz="1600" dirty="0"/>
+              <a:t>(“</a:t>
+            </a:r>
+            <a:r>
+              <a:rPr lang="en-US" sz="1600" dirty="0" err="1"/>
+              <a:t>dataset.xlsx</a:t>
+            </a:r>
+            <a:r>
+              <a:rPr lang="en-US" sz="1600" dirty="0"/>
+              <a:t>”)</a:t>
+            </a:r>
+          </a:p>
+          <a:p>
+            <a:pPr lvl="2"/>
+            <a:r>
+              <a:rPr lang="en-US" dirty="0"/>
+              <a:t>Other options include ‘xlsx’ and ‘</a:t>
+            </a:r>
+            <a:r>
+              <a:rPr lang="en-US" dirty="0" err="1"/>
+              <a:t>XLConnect</a:t>
+            </a:r>
+            <a:r>
+              <a:rPr lang="en-US" dirty="0"/>
+              <a:t>’ packages</a:t>
+            </a:r>
+          </a:p>
+          <a:p>
+            <a:pPr lvl="2"/>
+            <a:endParaRPr lang="en-US" dirty="0"/>
+          </a:p>
+          <a:p>
+            <a:r>
+              <a:rPr lang="en-US" dirty="0"/>
+              <a:t>R Studio Trick: </a:t>
+            </a:r>
+          </a:p>
+          <a:p>
+            <a:pPr lvl="1"/>
+            <a:r>
+              <a:rPr lang="en-US" dirty="0"/>
+              <a:t>use “import dataset” tool, or navigate to the location of your datafile and click on it and choose “import dataset”</a:t>
+            </a:r>
+          </a:p>
+          <a:p>
+            <a:pPr lvl="1"/>
+            <a:r>
+              <a:rPr lang="en-US" dirty="0"/>
+              <a:t>follow directions on the pop-up box</a:t>
+            </a:r>
+          </a:p>
+          <a:p>
+            <a:pPr lvl="1"/>
+            <a:r>
+              <a:rPr lang="en-US" dirty="0"/>
+              <a:t>copy the code that runs in your console into your script</a:t>
             </a:r>
           </a:p>
         </p:txBody>
@@ -6789,7 +4137,7 @@
     </p:spTree>
     <p:extLst>
       <p:ext uri="{BB962C8B-B14F-4D97-AF65-F5344CB8AC3E}">
-        <p14:creationId xmlns:p14="http://schemas.microsoft.com/office/powerpoint/2010/main" val="2945528832"/>
+        <p14:creationId xmlns:p14="http://schemas.microsoft.com/office/powerpoint/2010/main" val="2340844737"/>
       </p:ext>
     </p:extLst>
   </p:cSld>
@@ -6833,7 +4181,7 @@
           <a:p>
             <a:r>
               <a:rPr lang="en-US" dirty="0"/>
-              <a:t>1. Designing good datasheets</a:t>
+              <a:t>2. Read in data</a:t>
             </a:r>
           </a:p>
         </p:txBody>
@@ -6848,78 +4196,56 @@
             <p:ph idx="1"/>
           </p:nvPr>
         </p:nvSpPr>
-        <p:spPr>
-          <a:xfrm>
-            <a:off x="628650" y="1590678"/>
-            <a:ext cx="7886700" cy="4765675"/>
-          </a:xfrm>
-        </p:spPr>
-        <p:txBody>
-          <a:bodyPr>
-            <a:normAutofit lnSpcReduction="10000"/>
-          </a:bodyPr>
-          <a:lstStyle/>
-          <a:p>
-            <a:r>
-              <a:rPr lang="en-US" dirty="0"/>
-              <a:t>Header information – reduces repetition/empty space</a:t>
-            </a:r>
-          </a:p>
-          <a:p>
-            <a:r>
-              <a:rPr lang="en-US" dirty="0"/>
-              <a:t>Organization - what does a row mean? </a:t>
+        <p:spPr/>
+        <p:txBody>
+          <a:bodyPr/>
+          <a:lstStyle/>
+          <a:p>
+            <a:r>
+              <a:rPr lang="en-US" dirty="0"/>
+              <a:t>Things to think about: </a:t>
             </a:r>
           </a:p>
           <a:p>
             <a:pPr lvl="1"/>
             <a:r>
               <a:rPr lang="en-US" dirty="0"/>
-              <a:t>"Column variable, row observation"</a:t>
-            </a:r>
-          </a:p>
-          <a:p>
-            <a:r>
-              <a:rPr lang="en-US" dirty="0"/>
-              <a:t>Units of measurement clearly demarcated on datasheet</a:t>
-            </a:r>
-          </a:p>
-          <a:p>
-            <a:r>
-              <a:rPr lang="en-US" dirty="0"/>
-              <a:t>Use consistent codes (guide to codes at bottom)</a:t>
-            </a:r>
-          </a:p>
-          <a:p>
-            <a:r>
-              <a:rPr lang="en-US" dirty="0"/>
-              <a:t>Enough space to record data clearly</a:t>
-            </a:r>
-          </a:p>
-          <a:p>
-            <a:r>
-              <a:rPr lang="en-US" dirty="0"/>
-              <a:t>Room for notes</a:t>
-            </a:r>
-          </a:p>
-          <a:p>
-            <a:r>
-              <a:rPr lang="en-US" dirty="0"/>
-              <a:t>Page numbers (page __ of __)</a:t>
-            </a:r>
-          </a:p>
-          <a:p>
-            <a:r>
-              <a:rPr lang="en-US" dirty="0"/>
-              <a:t>Boxes for “entered, proofed, scanned”</a:t>
-            </a:r>
+              <a:t>Is there a header row? </a:t>
+            </a:r>
+          </a:p>
+          <a:p>
+            <a:pPr lvl="1"/>
+            <a:r>
+              <a:rPr lang="en-US" dirty="0"/>
+              <a:t>Do you want R to skip any rows at the top?</a:t>
+            </a:r>
+          </a:p>
+          <a:p>
+            <a:pPr lvl="1"/>
+            <a:r>
+              <a:rPr lang="en-US" dirty="0"/>
+              <a:t>What cell values should be read in as NA’s?</a:t>
+            </a:r>
+          </a:p>
+          <a:p>
+            <a:pPr lvl="1"/>
+            <a:r>
+              <a:rPr lang="en-US" dirty="0"/>
+              <a:t>Do you want R to guess the class of each column?  </a:t>
+            </a:r>
+          </a:p>
+          <a:p>
+            <a:endParaRPr lang="en-US" dirty="0"/>
+          </a:p>
+          <a:p>
+            <a:endParaRPr lang="en-US" dirty="0"/>
           </a:p>
         </p:txBody>
       </p:sp>
     </p:spTree>
     <p:extLst>
       <p:ext uri="{BB962C8B-B14F-4D97-AF65-F5344CB8AC3E}">
-        <p14:creationId xmlns:p14="http://schemas.microsoft.com/office/powerpoint/2010/main" val="1850004756"/>
+        <p14:creationId xmlns:p14="http://schemas.microsoft.com/office/powerpoint/2010/main" val="1280964767"/>
       </p:ext>
     </p:extLst>
   </p:cSld>
@@ -6958,12 +4284,14 @@
         </p:nvSpPr>
         <p:spPr/>
         <p:txBody>
-          <a:bodyPr/>
-          <a:lstStyle/>
-          <a:p>
-            <a:r>
-              <a:rPr lang="en-US" dirty="0"/>
-              <a:t>2. Make a tidy database</a:t>
+          <a:bodyPr>
+            <a:normAutofit/>
+          </a:bodyPr>
+          <a:lstStyle/>
+          <a:p>
+            <a:r>
+              <a:rPr lang="en-US" dirty="0"/>
+              <a:t>3. Explore your data</a:t>
             </a:r>
           </a:p>
         </p:txBody>
@@ -6978,55 +4306,136 @@
             <p:ph idx="1"/>
           </p:nvPr>
         </p:nvSpPr>
-        <p:spPr/>
-        <p:txBody>
-          <a:bodyPr/>
-          <a:lstStyle/>
-          <a:p>
-            <a:r>
-              <a:rPr lang="en-US" dirty="0">
-                <a:hlinkClick r:id="rId2"/>
-              </a:rPr>
-              <a:t>Hadley Wickham's Tidy Data</a:t>
-            </a:r>
+        <p:spPr>
+          <a:xfrm>
+            <a:off x="628650" y="1690689"/>
+            <a:ext cx="7886700" cy="3486222"/>
+          </a:xfrm>
+        </p:spPr>
+        <p:txBody>
+          <a:bodyPr numCol="2">
+            <a:normAutofit/>
+          </a:bodyPr>
+          <a:lstStyle/>
+          <a:p>
+            <a:r>
+              <a:rPr lang="en-US" dirty="0"/>
+              <a:t>Size</a:t>
+            </a:r>
+          </a:p>
+          <a:p>
+            <a:pPr lvl="1"/>
+            <a:r>
+              <a:rPr lang="en-US" dirty="0"/>
+              <a:t>dim()</a:t>
+            </a:r>
+          </a:p>
+          <a:p>
+            <a:pPr lvl="1"/>
+            <a:r>
+              <a:rPr lang="en-US" dirty="0" err="1"/>
+              <a:t>nrow</a:t>
+            </a:r>
+            <a:r>
+              <a:rPr lang="en-US" dirty="0"/>
+              <a:t>()</a:t>
+            </a:r>
+          </a:p>
+          <a:p>
+            <a:pPr lvl="1"/>
+            <a:r>
+              <a:rPr lang="en-US" dirty="0" err="1"/>
+              <a:t>ncol</a:t>
+            </a:r>
+            <a:r>
+              <a:rPr lang="en-US" dirty="0"/>
+              <a:t>()</a:t>
+            </a:r>
+          </a:p>
+          <a:p>
+            <a:r>
+              <a:rPr lang="en-US" dirty="0"/>
+              <a:t>Content</a:t>
+            </a:r>
+          </a:p>
+          <a:p>
+            <a:pPr lvl="1"/>
+            <a:r>
+              <a:rPr lang="en-US" dirty="0"/>
+              <a:t>head()</a:t>
+            </a:r>
+          </a:p>
+          <a:p>
+            <a:pPr lvl="1"/>
+            <a:r>
+              <a:rPr lang="en-US" dirty="0"/>
+              <a:t>tail()</a:t>
+            </a:r>
+          </a:p>
+          <a:p>
+            <a:pPr marL="457200" lvl="1" indent="0">
+              <a:buNone/>
+            </a:pPr>
             <a:endParaRPr lang="en-US" dirty="0"/>
           </a:p>
           <a:p>
             <a:r>
               <a:rPr lang="en-US" dirty="0"/>
-              <a:t>In tidy data:</a:t>
+              <a:t>Names</a:t>
             </a:r>
           </a:p>
           <a:p>
             <a:pPr lvl="1"/>
             <a:r>
-              <a:rPr lang="en-US" dirty="0"/>
-              <a:t>Each variable forms a column.</a:t>
+              <a:rPr lang="en-US" dirty="0" err="1"/>
+              <a:t>colnames</a:t>
+            </a:r>
+            <a:r>
+              <a:rPr lang="en-US" dirty="0"/>
+              <a:t>()</a:t>
             </a:r>
           </a:p>
           <a:p>
             <a:pPr lvl="1"/>
             <a:r>
-              <a:rPr lang="en-US" dirty="0"/>
-              <a:t>Each observation forms a row.</a:t>
+              <a:rPr lang="en-US" dirty="0" err="1"/>
+              <a:t>rownames</a:t>
+            </a:r>
+            <a:r>
+              <a:rPr lang="en-US" dirty="0"/>
+              <a:t>()</a:t>
             </a:r>
           </a:p>
           <a:p>
             <a:pPr lvl="1"/>
-            <a:r>
-              <a:rPr lang="en-US" dirty="0"/>
-              <a:t>Each type of observational unit forms a table.</a:t>
-            </a:r>
-          </a:p>
-          <a:p>
             <a:endParaRPr lang="en-US" dirty="0"/>
+          </a:p>
+          <a:p>
+            <a:r>
+              <a:rPr lang="en-US" dirty="0"/>
+              <a:t>Summary</a:t>
+            </a:r>
+          </a:p>
+          <a:p>
+            <a:pPr lvl="1"/>
+            <a:r>
+              <a:rPr lang="en-US" dirty="0"/>
+              <a:t>str()</a:t>
+            </a:r>
+          </a:p>
+          <a:p>
+            <a:pPr lvl="1"/>
+            <a:r>
+              <a:rPr lang="en-US" dirty="0"/>
+              <a:t>summary()</a:t>
+            </a:r>
           </a:p>
         </p:txBody>
       </p:sp>
     </p:spTree>
     <p:extLst>
       <p:ext uri="{BB962C8B-B14F-4D97-AF65-F5344CB8AC3E}">
-        <p14:creationId xmlns:p14="http://schemas.microsoft.com/office/powerpoint/2010/main" val="3793190632"/>
+        <p14:creationId xmlns:p14="http://schemas.microsoft.com/office/powerpoint/2010/main" val="2596782662"/>
       </p:ext>
     </p:extLst>
   </p:cSld>
@@ -7070,85 +4479,338 @@
           <a:p>
             <a:r>
               <a:rPr lang="en-US" dirty="0"/>
-              <a:t>Exercise</a:t>
-            </a:r>
-          </a:p>
-        </p:txBody>
-      </p:sp>
-      <p:sp>
-        <p:nvSpPr>
-          <p:cNvPr id="3" name="Content Placeholder 2"/>
-          <p:cNvSpPr>
-            <a:spLocks noGrp="1"/>
-          </p:cNvSpPr>
+              <a:t>5. R Data Structures</a:t>
+            </a:r>
+          </a:p>
+        </p:txBody>
+      </p:sp>
+      <p:graphicFrame>
+        <p:nvGraphicFramePr>
+          <p:cNvPr id="4" name="Content Placeholder 3"/>
+          <p:cNvGraphicFramePr>
+            <a:graphicFrameLocks noGrp="1"/>
+          </p:cNvGraphicFramePr>
           <p:nvPr>
             <p:ph idx="1"/>
-          </p:nvPr>
-        </p:nvSpPr>
-        <p:spPr/>
-        <p:txBody>
-          <a:bodyPr/>
-          <a:lstStyle/>
-          <a:p>
-            <a:r>
-              <a:rPr lang="en-US" dirty="0"/>
-              <a:t>Part 1</a:t>
-            </a:r>
-          </a:p>
-          <a:p>
-            <a:pPr lvl="1"/>
-            <a:r>
-              <a:rPr lang="en-US" dirty="0"/>
-              <a:t>Look at  </a:t>
+            <p:extLst/>
+          </p:nvPr>
+        </p:nvGraphicFramePr>
+        <p:xfrm>
+          <a:off x="457200" y="1371600"/>
+          <a:ext cx="8153400" cy="3055950"/>
+        </p:xfrm>
+        <a:graphic>
+          <a:graphicData uri="http://schemas.openxmlformats.org/drawingml/2006/table">
+            <a:tbl>
+              <a:tblPr firstRow="1" bandRow="1">
+                <a:tableStyleId>{5C22544A-7EE6-4342-B048-85BDC9FD1C3A}</a:tableStyleId>
+              </a:tblPr>
+              <a:tblGrid>
+                <a:gridCol w="2717800">
+                  <a:extLst>
+                    <a:ext uri="{9D8B030D-6E8A-4147-A177-3AD203B41FA5}">
+                      <a16:colId xmlns:a16="http://schemas.microsoft.com/office/drawing/2014/main" val="20000"/>
+                    </a:ext>
+                  </a:extLst>
+                </a:gridCol>
+                <a:gridCol w="2717800">
+                  <a:extLst>
+                    <a:ext uri="{9D8B030D-6E8A-4147-A177-3AD203B41FA5}">
+                      <a16:colId xmlns:a16="http://schemas.microsoft.com/office/drawing/2014/main" val="20001"/>
+                    </a:ext>
+                  </a:extLst>
+                </a:gridCol>
+                <a:gridCol w="2717800">
+                  <a:extLst>
+                    <a:ext uri="{9D8B030D-6E8A-4147-A177-3AD203B41FA5}">
+                      <a16:colId xmlns:a16="http://schemas.microsoft.com/office/drawing/2014/main" val="20002"/>
+                    </a:ext>
+                  </a:extLst>
+                </a:gridCol>
+              </a:tblGrid>
+              <a:tr h="685800">
+                <a:tc>
+                  <a:txBody>
+                    <a:bodyPr/>
+                    <a:lstStyle/>
+                    <a:p>
+                      <a:r>
+                        <a:rPr lang="en-US" dirty="0"/>
+                        <a:t>Dimensions</a:t>
+                      </a:r>
+                    </a:p>
+                  </a:txBody>
+                  <a:tcPr/>
+                </a:tc>
+                <a:tc>
+                  <a:txBody>
+                    <a:bodyPr/>
+                    <a:lstStyle/>
+                    <a:p>
+                      <a:r>
+                        <a:rPr lang="en-US" dirty="0"/>
+                        <a:t>Same type of information</a:t>
+                      </a:r>
+                    </a:p>
+                  </a:txBody>
+                  <a:tcPr/>
+                </a:tc>
+                <a:tc>
+                  <a:txBody>
+                    <a:bodyPr/>
+                    <a:lstStyle/>
+                    <a:p>
+                      <a:r>
+                        <a:rPr lang="en-US" dirty="0"/>
+                        <a:t>Different type of information</a:t>
+                      </a:r>
+                    </a:p>
+                  </a:txBody>
+                  <a:tcPr/>
+                </a:tc>
+                <a:extLst>
+                  <a:ext uri="{0D108BD9-81ED-4DB2-BD59-A6C34878D82A}">
+                    <a16:rowId xmlns:a16="http://schemas.microsoft.com/office/drawing/2014/main" val="10000"/>
+                  </a:ext>
+                </a:extLst>
+              </a:tr>
+              <a:tr h="790050">
+                <a:tc>
+                  <a:txBody>
+                    <a:bodyPr/>
+                    <a:lstStyle/>
+                    <a:p>
+                      <a:pPr algn="ctr"/>
+                      <a:r>
+                        <a:rPr lang="en-US" dirty="0"/>
+                        <a:t>1-dimensional</a:t>
+                      </a:r>
+                    </a:p>
+                  </a:txBody>
+                  <a:tcPr anchor="ctr"/>
+                </a:tc>
+                <a:tc>
+                  <a:txBody>
+                    <a:bodyPr/>
+                    <a:lstStyle/>
+                    <a:p>
+                      <a:pPr algn="ctr"/>
+                      <a:r>
+                        <a:rPr lang="en-US" dirty="0"/>
+                        <a:t>Vector</a:t>
+                      </a:r>
+                    </a:p>
+                  </a:txBody>
+                  <a:tcPr anchor="ctr"/>
+                </a:tc>
+                <a:tc>
+                  <a:txBody>
+                    <a:bodyPr/>
+                    <a:lstStyle/>
+                    <a:p>
+                      <a:pPr algn="ctr"/>
+                      <a:r>
+                        <a:rPr lang="en-US" dirty="0"/>
+                        <a:t>List</a:t>
+                      </a:r>
+                    </a:p>
+                  </a:txBody>
+                  <a:tcPr anchor="ctr"/>
+                </a:tc>
+                <a:extLst>
+                  <a:ext uri="{0D108BD9-81ED-4DB2-BD59-A6C34878D82A}">
+                    <a16:rowId xmlns:a16="http://schemas.microsoft.com/office/drawing/2014/main" val="10001"/>
+                  </a:ext>
+                </a:extLst>
+              </a:tr>
+              <a:tr h="790050">
+                <a:tc>
+                  <a:txBody>
+                    <a:bodyPr/>
+                    <a:lstStyle/>
+                    <a:p>
+                      <a:pPr algn="ctr"/>
+                      <a:r>
+                        <a:rPr lang="en-US" dirty="0"/>
+                        <a:t>2-dimensional</a:t>
+                      </a:r>
+                    </a:p>
+                  </a:txBody>
+                  <a:tcPr anchor="ctr"/>
+                </a:tc>
+                <a:tc>
+                  <a:txBody>
+                    <a:bodyPr/>
+                    <a:lstStyle/>
+                    <a:p>
+                      <a:pPr algn="ctr"/>
+                      <a:r>
+                        <a:rPr lang="en-US" dirty="0"/>
+                        <a:t>Matrix</a:t>
+                      </a:r>
+                    </a:p>
+                  </a:txBody>
+                  <a:tcPr anchor="ctr"/>
+                </a:tc>
+                <a:tc>
+                  <a:txBody>
+                    <a:bodyPr/>
+                    <a:lstStyle/>
+                    <a:p>
+                      <a:pPr algn="ctr"/>
+                      <a:r>
+                        <a:rPr lang="en-US" dirty="0"/>
+                        <a:t>Data</a:t>
+                      </a:r>
+                      <a:r>
+                        <a:rPr lang="en-US" baseline="0" dirty="0"/>
+                        <a:t> Frame/Tibble</a:t>
+                      </a:r>
+                      <a:endParaRPr lang="en-US" dirty="0"/>
+                    </a:p>
+                  </a:txBody>
+                  <a:tcPr anchor="ctr"/>
+                </a:tc>
+                <a:extLst>
+                  <a:ext uri="{0D108BD9-81ED-4DB2-BD59-A6C34878D82A}">
+                    <a16:rowId xmlns:a16="http://schemas.microsoft.com/office/drawing/2014/main" val="10002"/>
+                  </a:ext>
+                </a:extLst>
+              </a:tr>
+              <a:tr h="790050">
+                <a:tc>
+                  <a:txBody>
+                    <a:bodyPr/>
+                    <a:lstStyle/>
+                    <a:p>
+                      <a:pPr algn="ctr"/>
+                      <a:r>
+                        <a:rPr lang="en-US" dirty="0"/>
+                        <a:t>N-dimensional</a:t>
+                      </a:r>
+                    </a:p>
+                  </a:txBody>
+                  <a:tcPr anchor="ctr"/>
+                </a:tc>
+                <a:tc>
+                  <a:txBody>
+                    <a:bodyPr/>
+                    <a:lstStyle/>
+                    <a:p>
+                      <a:pPr algn="ctr"/>
+                      <a:r>
+                        <a:rPr lang="en-US" dirty="0"/>
+                        <a:t>Array</a:t>
+                      </a:r>
+                    </a:p>
+                  </a:txBody>
+                  <a:tcPr anchor="ctr"/>
+                </a:tc>
+                <a:tc>
+                  <a:txBody>
+                    <a:bodyPr/>
+                    <a:lstStyle/>
+                    <a:p>
+                      <a:pPr algn="ctr"/>
+                      <a:r>
+                        <a:rPr lang="en-US" dirty="0"/>
+                        <a:t>---</a:t>
+                      </a:r>
+                    </a:p>
+                  </a:txBody>
+                  <a:tcPr anchor="ctr"/>
+                </a:tc>
+                <a:extLst>
+                  <a:ext uri="{0D108BD9-81ED-4DB2-BD59-A6C34878D82A}">
+                    <a16:rowId xmlns:a16="http://schemas.microsoft.com/office/drawing/2014/main" val="10003"/>
+                  </a:ext>
+                </a:extLst>
+              </a:tr>
+            </a:tbl>
+          </a:graphicData>
+        </a:graphic>
+      </p:graphicFrame>
+      <p:sp>
+        <p:nvSpPr>
+          <p:cNvPr id="5" name="TextBox 4"/>
+          <p:cNvSpPr txBox="1"/>
+          <p:nvPr/>
+        </p:nvSpPr>
+        <p:spPr>
+          <a:xfrm>
+            <a:off x="571500" y="4549676"/>
+            <a:ext cx="8001000" cy="2308324"/>
+          </a:xfrm>
+          <a:prstGeom prst="rect">
+            <a:avLst/>
+          </a:prstGeom>
+          <a:noFill/>
+        </p:spPr>
+        <p:txBody>
+          <a:bodyPr wrap="square" rtlCol="0">
+            <a:spAutoFit/>
+          </a:bodyPr>
+          <a:lstStyle/>
+          <a:p>
+            <a:pPr marL="0" lvl="1"/>
+            <a:r>
+              <a:rPr lang="en-US" dirty="0"/>
+              <a:t>Vector- Sequence of any values, including numeric, character, and NA</a:t>
+            </a:r>
+          </a:p>
+          <a:p>
+            <a:pPr marL="0" lvl="1"/>
+            <a:r>
+              <a:rPr lang="en-US" dirty="0"/>
+              <a:t>Matrix- Vector of vectors; all same type of information (numeric); this is a type of an array</a:t>
+            </a:r>
+          </a:p>
+          <a:p>
+            <a:pPr marL="0" lvl="1"/>
+            <a:r>
+              <a:rPr lang="en-US" dirty="0"/>
+              <a:t>Data Frame- Matrix-like structure, but each column can be a different type (e.g. factor, numeric, character etc.)</a:t>
+            </a:r>
+          </a:p>
+          <a:p>
+            <a:pPr marL="0" lvl="1"/>
+            <a:r>
+              <a:rPr lang="en-US" dirty="0"/>
+              <a:t>Tibble – modern </a:t>
             </a:r>
             <a:r>
               <a:rPr lang="en-US" dirty="0" err="1"/>
-              <a:t>transplant_raw.csv</a:t>
+              <a:t>tidyverse</a:t>
+            </a:r>
+            <a:r>
+              <a:rPr lang="en-US" dirty="0"/>
+              <a:t> version of the </a:t>
+            </a:r>
+            <a:r>
+              <a:rPr lang="en-US" dirty="0" err="1"/>
+              <a:t>dataframe</a:t>
             </a:r>
             <a:endParaRPr lang="en-US" dirty="0"/>
           </a:p>
           <a:p>
-            <a:pPr lvl="1"/>
-            <a:r>
-              <a:rPr lang="en-US" dirty="0"/>
-              <a:t>What would you change in this database?</a:t>
-            </a:r>
-          </a:p>
-          <a:p>
-            <a:endParaRPr lang="en-US" dirty="0"/>
-          </a:p>
-          <a:p>
-            <a:r>
-              <a:rPr lang="en-US" dirty="0"/>
-              <a:t>Part 2</a:t>
-            </a:r>
-          </a:p>
-          <a:p>
-            <a:pPr lvl="1"/>
-            <a:r>
-              <a:rPr lang="en-US" dirty="0"/>
-              <a:t>Open up your own database</a:t>
-            </a:r>
-          </a:p>
-          <a:p>
-            <a:pPr lvl="1"/>
-            <a:r>
-              <a:rPr lang="en-US" dirty="0"/>
-              <a:t>What would you change in your database? </a:t>
-            </a:r>
-          </a:p>
-          <a:p>
-            <a:endParaRPr lang="en-US" dirty="0"/>
-          </a:p>
-          <a:p>
-            <a:endParaRPr lang="en-US" dirty="0"/>
+            <a:pPr marL="0" lvl="1"/>
+            <a:r>
+              <a:rPr lang="en-US" dirty="0"/>
+              <a:t>Array- multi-dimensional generalization of vectors</a:t>
+            </a:r>
+          </a:p>
+          <a:p>
+            <a:r>
+              <a:rPr lang="en-US" dirty="0"/>
+              <a:t>List- Ordered sequences of objects which can be of any type </a:t>
+            </a:r>
           </a:p>
         </p:txBody>
       </p:sp>
     </p:spTree>
     <p:extLst>
       <p:ext uri="{BB962C8B-B14F-4D97-AF65-F5344CB8AC3E}">
-        <p14:creationId xmlns:p14="http://schemas.microsoft.com/office/powerpoint/2010/main" val="587847242"/>
+        <p14:creationId xmlns:p14="http://schemas.microsoft.com/office/powerpoint/2010/main" val="1610829255"/>
       </p:ext>
     </p:extLst>
   </p:cSld>
@@ -7177,158 +4839,130 @@
       </p:grpSpPr>
       <p:sp>
         <p:nvSpPr>
-          <p:cNvPr id="2" name="Title 1"/>
+          <p:cNvPr id="2" name="Title 1">
+            <a:extLst>
+              <a:ext uri="{FF2B5EF4-FFF2-40B4-BE49-F238E27FC236}">
+                <a16:creationId xmlns:a16="http://schemas.microsoft.com/office/drawing/2014/main" id="{048C558D-E455-8C4D-8CF1-4886155AD60D}"/>
+              </a:ext>
+            </a:extLst>
+          </p:cNvPr>
           <p:cNvSpPr>
             <a:spLocks noGrp="1"/>
           </p:cNvSpPr>
           <p:nvPr>
             <p:ph type="title"/>
+          </p:nvPr>
+        </p:nvSpPr>
+        <p:spPr/>
+        <p:txBody>
+          <a:bodyPr/>
+          <a:lstStyle/>
+          <a:p>
+            <a:r>
+              <a:rPr lang="en-US" dirty="0"/>
+              <a:t>3. Tibbles</a:t>
+            </a:r>
+          </a:p>
+        </p:txBody>
+      </p:sp>
+      <p:sp>
+        <p:nvSpPr>
+          <p:cNvPr id="3" name="Content Placeholder 2">
+            <a:extLst>
+              <a:ext uri="{FF2B5EF4-FFF2-40B4-BE49-F238E27FC236}">
+                <a16:creationId xmlns:a16="http://schemas.microsoft.com/office/drawing/2014/main" id="{3BD19ABD-39E4-AE42-B840-496BD8F4B528}"/>
+              </a:ext>
+            </a:extLst>
+          </p:cNvPr>
+          <p:cNvSpPr>
+            <a:spLocks noGrp="1"/>
+          </p:cNvSpPr>
+          <p:nvPr>
+            <p:ph idx="1"/>
           </p:nvPr>
         </p:nvSpPr>
         <p:spPr>
           <a:xfrm>
-            <a:off x="457200" y="-76314"/>
-            <a:ext cx="8229600" cy="1143000"/>
+            <a:off x="628650" y="1690689"/>
+            <a:ext cx="7886700" cy="4742058"/>
           </a:xfrm>
         </p:spPr>
         <p:txBody>
-          <a:bodyPr/>
-          <a:lstStyle/>
-          <a:p>
-            <a:r>
-              <a:rPr lang="en-US" dirty="0"/>
-              <a:t>2. Make a tidy database</a:t>
-            </a:r>
-          </a:p>
-        </p:txBody>
-      </p:sp>
-      <p:sp>
-        <p:nvSpPr>
-          <p:cNvPr id="3" name="Content Placeholder 2"/>
-          <p:cNvSpPr>
-            <a:spLocks noGrp="1"/>
-          </p:cNvSpPr>
-          <p:nvPr>
-            <p:ph idx="1"/>
-          </p:nvPr>
-        </p:nvSpPr>
-        <p:spPr>
-          <a:xfrm>
-            <a:off x="457200" y="1066688"/>
-            <a:ext cx="8229600" cy="5634643"/>
-          </a:xfrm>
-        </p:spPr>
-        <p:txBody>
           <a:bodyPr>
-            <a:normAutofit fontScale="92500" lnSpcReduction="20000"/>
+            <a:normAutofit lnSpcReduction="10000"/>
           </a:bodyPr>
           <a:lstStyle/>
           <a:p>
-            <a:pPr marL="514350" indent="-514350">
-              <a:buFont typeface="+mj-lt"/>
-              <a:buAutoNum type="arabicPeriod"/>
-            </a:pPr>
-            <a:r>
-              <a:rPr lang="en-US" dirty="0"/>
-              <a:t>Name columns with R in mind</a:t>
-            </a:r>
-          </a:p>
-          <a:p>
-            <a:pPr marL="514350" indent="-514350">
-              <a:buFont typeface="+mj-lt"/>
-              <a:buAutoNum type="arabicPeriod"/>
-            </a:pPr>
-            <a:r>
-              <a:rPr lang="en-US" dirty="0"/>
-              <a:t>Use consistent codes (if Excel, consider data validation)</a:t>
-            </a:r>
-          </a:p>
-          <a:p>
-            <a:pPr marL="514350" indent="-514350">
-              <a:buFont typeface="+mj-lt"/>
-              <a:buAutoNum type="arabicPeriod"/>
-            </a:pPr>
-            <a:r>
-              <a:rPr lang="en-US" dirty="0"/>
-              <a:t>Remember, case matters in R (upper </a:t>
+            <a:r>
+              <a:rPr lang="en-US" dirty="0"/>
+              <a:t>Base R uses data frames. </a:t>
             </a:r>
             <a:r>
               <a:rPr lang="en-US" dirty="0" err="1"/>
-              <a:t>vs</a:t>
-            </a:r>
-            <a:r>
-              <a:rPr lang="en-US" dirty="0"/>
-              <a:t> lower)</a:t>
-            </a:r>
-          </a:p>
-          <a:p>
-            <a:pPr marL="514350" indent="-514350">
-              <a:buFont typeface="+mj-lt"/>
-              <a:buAutoNum type="arabicPeriod"/>
-            </a:pPr>
-            <a:r>
-              <a:rPr lang="en-US" dirty="0"/>
-              <a:t>Store with appropriate date/time formats</a:t>
-            </a:r>
-          </a:p>
-          <a:p>
-            <a:pPr marL="514350" indent="-514350">
-              <a:buFont typeface="+mj-lt"/>
-              <a:buAutoNum type="arabicPeriod"/>
-            </a:pPr>
-            <a:r>
-              <a:rPr lang="en-US" dirty="0"/>
-              <a:t>Identify estimated data (should not be entered in a manner identical to measured data)</a:t>
-            </a:r>
-          </a:p>
-          <a:p>
-            <a:pPr marL="514350" indent="-514350">
-              <a:buFont typeface="+mj-lt"/>
-              <a:buAutoNum type="arabicPeriod"/>
-            </a:pPr>
-            <a:r>
-              <a:rPr lang="en-US" dirty="0"/>
-              <a:t>Identify missing values and define missing value codes; make sure true zeros are distinguished from missing data. </a:t>
-            </a:r>
-          </a:p>
-          <a:p>
-            <a:pPr marL="514350" indent="-514350">
-              <a:buFont typeface="+mj-lt"/>
-              <a:buAutoNum type="arabicPeriod"/>
-            </a:pPr>
-            <a:r>
-              <a:rPr lang="en-US" dirty="0"/>
-              <a:t>Separate data from notes</a:t>
-            </a:r>
-          </a:p>
-          <a:p>
-            <a:pPr marL="514350" indent="-514350">
-              <a:buFont typeface="+mj-lt"/>
-              <a:buAutoNum type="arabicPeriod"/>
-            </a:pPr>
-            <a:r>
-              <a:rPr lang="en-US" dirty="0"/>
-              <a:t>Use R-safe delimiters (avoid commas within a cell, symbols)</a:t>
-            </a:r>
-          </a:p>
-          <a:p>
-            <a:pPr marL="914400" lvl="1" indent="-514350">
-              <a:buFont typeface="+mj-lt"/>
-              <a:buAutoNum type="arabicPeriod"/>
-            </a:pPr>
-            <a:r>
-              <a:rPr lang="en-US" dirty="0"/>
-              <a:t>Avoid using delimiters that also occur in the data fields or avoid putting delimiters in data field. </a:t>
-            </a:r>
-          </a:p>
-          <a:p>
-            <a:pPr marL="914400" lvl="1" indent="-514350">
-              <a:buFont typeface="+mj-lt"/>
-              <a:buAutoNum type="arabicPeriod"/>
-            </a:pPr>
-            <a:r>
-              <a:rPr lang="en-US" dirty="0"/>
-              <a:t>If this cannot be avoided, enclose data fields that also contain a delimiter in single or double quotes.</a:t>
+              <a:t>Readr</a:t>
+            </a:r>
+            <a:r>
+              <a:rPr lang="en-US" dirty="0"/>
+              <a:t> and </a:t>
+            </a:r>
+            <a:r>
+              <a:rPr lang="en-US" dirty="0" err="1"/>
+              <a:t>readxl</a:t>
+            </a:r>
+            <a:r>
+              <a:rPr lang="en-US" dirty="0"/>
+              <a:t> automatically create </a:t>
+            </a:r>
+            <a:r>
+              <a:rPr lang="en-US" dirty="0" err="1"/>
+              <a:t>tibbles</a:t>
+            </a:r>
+            <a:r>
+              <a:rPr lang="en-US" dirty="0"/>
+              <a:t>. </a:t>
+            </a:r>
+          </a:p>
+          <a:p>
+            <a:r>
+              <a:rPr lang="en-US" dirty="0"/>
+              <a:t>Tibbles are </a:t>
+            </a:r>
+            <a:r>
+              <a:rPr lang="en-US" dirty="0" err="1"/>
+              <a:t>dataframes</a:t>
+            </a:r>
+            <a:r>
+              <a:rPr lang="en-US" dirty="0"/>
+              <a:t>, but they have slightly different properties than traditional </a:t>
+            </a:r>
+            <a:r>
+              <a:rPr lang="en-US" dirty="0" err="1"/>
+              <a:t>dataframes</a:t>
+            </a:r>
+            <a:endParaRPr lang="en-US" dirty="0"/>
+          </a:p>
+          <a:p>
+            <a:r>
+              <a:rPr lang="en-US" dirty="0"/>
+              <a:t>Tibbles do not automatically change the class of the input, names of variables, or create row names</a:t>
+            </a:r>
+          </a:p>
+          <a:p>
+            <a:r>
+              <a:rPr lang="en-US" dirty="0"/>
+              <a:t>Tibbles can handle invalid R variable names (e.g. numbers, punctuation)</a:t>
+            </a:r>
+          </a:p>
+          <a:p>
+            <a:r>
+              <a:rPr lang="en-US" dirty="0"/>
+              <a:t>Tibbles only show the first 10 rows when you ‘print’</a:t>
+            </a:r>
+          </a:p>
+          <a:p>
+            <a:r>
+              <a:rPr lang="en-US" dirty="0"/>
+              <a:t>Tibbles don’t always play well with the single square brackets []</a:t>
             </a:r>
           </a:p>
         </p:txBody>
@@ -7336,7 +4970,7 @@
     </p:spTree>
     <p:extLst>
       <p:ext uri="{BB962C8B-B14F-4D97-AF65-F5344CB8AC3E}">
-        <p14:creationId xmlns:p14="http://schemas.microsoft.com/office/powerpoint/2010/main" val="1741981114"/>
+        <p14:creationId xmlns:p14="http://schemas.microsoft.com/office/powerpoint/2010/main" val="2629798875"/>
       </p:ext>
     </p:extLst>
   </p:cSld>
@@ -7380,7 +5014,7 @@
           <a:p>
             <a:r>
               <a:rPr lang="en-US" dirty="0"/>
-              <a:t>3. Code with style</a:t>
+              <a:t>6. Data classes</a:t>
             </a:r>
           </a:p>
         </p:txBody>
@@ -7395,127 +5029,83 @@
             <p:ph idx="1"/>
           </p:nvPr>
         </p:nvSpPr>
-        <p:spPr>
-          <a:xfrm>
-            <a:off x="457200" y="1600200"/>
-            <a:ext cx="8229600" cy="4953000"/>
-          </a:xfrm>
-        </p:spPr>
+        <p:spPr/>
         <p:txBody>
           <a:bodyPr>
-            <a:normAutofit/>
+            <a:normAutofit lnSpcReduction="10000"/>
           </a:bodyPr>
           <a:lstStyle/>
           <a:p>
-            <a:pPr marL="0" indent="0" algn="ctr">
-              <a:buNone/>
-            </a:pPr>
-            <a:r>
-              <a:rPr lang="en-US" dirty="0"/>
-              <a:t>Style is important so YOU and OTHERS can read your code and actually use it</a:t>
-            </a:r>
-          </a:p>
-          <a:p>
-            <a:pPr marL="0" indent="0">
-              <a:buNone/>
-            </a:pPr>
+            <a:r>
+              <a:rPr lang="en-US" b="1" dirty="0"/>
+              <a:t>Integer</a:t>
+            </a:r>
+            <a:r>
+              <a:rPr lang="en-US" dirty="0"/>
+              <a:t>- whole numbers</a:t>
+            </a:r>
+          </a:p>
+          <a:p>
+            <a:r>
+              <a:rPr lang="en-US" b="1" dirty="0"/>
+              <a:t>Numeric</a:t>
+            </a:r>
+            <a:r>
+              <a:rPr lang="en-US" dirty="0"/>
+              <a:t>- real numbers</a:t>
+            </a:r>
+          </a:p>
+          <a:p>
+            <a:r>
+              <a:rPr lang="en-US" b="1" dirty="0"/>
+              <a:t>Logical </a:t>
+            </a:r>
+            <a:r>
+              <a:rPr lang="en-US" dirty="0"/>
+              <a:t>– True/false</a:t>
+            </a:r>
+          </a:p>
+          <a:p>
+            <a:r>
+              <a:rPr lang="en-US" b="1" dirty="0"/>
+              <a:t>Character</a:t>
+            </a:r>
+            <a:r>
+              <a:rPr lang="en-US" dirty="0"/>
+              <a:t>- alphanumeric strings</a:t>
+            </a:r>
+          </a:p>
+          <a:p>
+            <a:r>
+              <a:rPr lang="en-US" b="1" dirty="0"/>
+              <a:t>Factor</a:t>
+            </a:r>
+            <a:r>
+              <a:rPr lang="en-US" dirty="0"/>
+              <a:t>- Categorical data (R stores as a set of levels, with a # associated with each level)</a:t>
+            </a:r>
+          </a:p>
+          <a:p>
+            <a:r>
+              <a:rPr lang="en-US" b="1" dirty="0"/>
+              <a:t>Date</a:t>
+            </a:r>
+          </a:p>
+          <a:p>
             <a:endParaRPr lang="en-US" dirty="0"/>
           </a:p>
           <a:p>
             <a:r>
-              <a:rPr lang="en-US" dirty="0">
-                <a:hlinkClick r:id="rId2"/>
-              </a:rPr>
-              <a:t>Tidyverse Style Guide</a:t>
-            </a:r>
-            <a:endParaRPr lang="en-US" dirty="0"/>
-          </a:p>
-          <a:p>
-            <a:r>
-              <a:rPr lang="en-US" dirty="0">
-                <a:hlinkClick r:id="rId3">
-                  <a:extLst>
-                    <a:ext uri="{A12FA001-AC4F-418D-AE19-62706E023703}">
-                      <ahyp:hlinkClr xmlns:ahyp="http://schemas.microsoft.com/office/drawing/2018/hyperlinkcolor" val="tx"/>
-                    </a:ext>
-                  </a:extLst>
-                </a:hlinkClick>
-              </a:rPr>
-              <a:t>Hadley Wickham's style guide</a:t>
-            </a:r>
-            <a:endParaRPr lang="en-US" dirty="0">
-              <a:hlinkClick r:id="rId4">
-                <a:extLst>
-                  <a:ext uri="{A12FA001-AC4F-418D-AE19-62706E023703}">
-                    <ahyp:hlinkClr xmlns:ahyp="http://schemas.microsoft.com/office/drawing/2018/hyperlinkcolor" val="tx"/>
-                  </a:ext>
-                </a:extLst>
-              </a:hlinkClick>
-            </a:endParaRPr>
-          </a:p>
-          <a:p>
-            <a:r>
-              <a:rPr lang="en-US" dirty="0">
-                <a:hlinkClick r:id="rId4">
-                  <a:extLst>
-                    <a:ext uri="{A12FA001-AC4F-418D-AE19-62706E023703}">
-                      <ahyp:hlinkClr xmlns:ahyp="http://schemas.microsoft.com/office/drawing/2018/hyperlinkcolor" val="tx"/>
-                    </a:ext>
-                  </a:extLst>
-                </a:hlinkClick>
-              </a:rPr>
-              <a:t>Google style guide</a:t>
-            </a:r>
-            <a:endParaRPr lang="en-US" dirty="0"/>
-          </a:p>
-          <a:p>
-            <a:r>
-              <a:rPr lang="en-US" dirty="0">
-                <a:hlinkClick r:id="rId5">
-                  <a:extLst>
-                    <a:ext uri="{A12FA001-AC4F-418D-AE19-62706E023703}">
-                      <ahyp:hlinkClr xmlns:ahyp="http://schemas.microsoft.com/office/drawing/2018/hyperlinkcolor" val="tx"/>
-                    </a:ext>
-                  </a:extLst>
-                </a:hlinkClick>
-              </a:rPr>
-              <a:t>Condensed version of Google/Hadley guide</a:t>
-            </a:r>
-            <a:endParaRPr lang="en-US" dirty="0"/>
-          </a:p>
-          <a:p>
-            <a:r>
-              <a:rPr lang="en-US" dirty="0">
-                <a:hlinkClick r:id="rId6">
-                  <a:extLst>
-                    <a:ext uri="{A12FA001-AC4F-418D-AE19-62706E023703}">
-                      <ahyp:hlinkClr xmlns:ahyp="http://schemas.microsoft.com/office/drawing/2018/hyperlinkcolor" val="tx"/>
-                    </a:ext>
-                  </a:extLst>
-                </a:hlinkClick>
-              </a:rPr>
-              <a:t>Henrik Bengtsson style guide</a:t>
-            </a:r>
-            <a:endParaRPr lang="en-US" dirty="0"/>
-          </a:p>
-          <a:p>
-            <a:endParaRPr lang="en-US" dirty="0"/>
-          </a:p>
-          <a:p>
-            <a:r>
-              <a:rPr lang="en-US" dirty="0"/>
-              <a:t>R Studio- Preferences - Diagnostics</a:t>
-            </a:r>
-          </a:p>
-          <a:p>
-            <a:endParaRPr lang="en-US" dirty="0"/>
+              <a:rPr lang="en-US" dirty="0"/>
+              <a:t>Use ‘class’ to check type of data in a vector</a:t>
+            </a:r>
           </a:p>
         </p:txBody>
       </p:sp>
     </p:spTree>
     <p:extLst>
       <p:ext uri="{BB962C8B-B14F-4D97-AF65-F5344CB8AC3E}">
-        <p14:creationId xmlns:p14="http://schemas.microsoft.com/office/powerpoint/2010/main" val="254822252"/>
+        <p14:creationId xmlns:p14="http://schemas.microsoft.com/office/powerpoint/2010/main" val="3976315561"/>
       </p:ext>
     </p:extLst>
   </p:cSld>
@@ -7544,7 +5134,13 @@
       </p:grpSpPr>
       <p:sp>
         <p:nvSpPr>
-          <p:cNvPr id="2" name="Title 1"/>
+          <p:cNvPr id="2" name="Title 1">
+            <a:extLst>
+              <a:ext uri="{FF2B5EF4-FFF2-40B4-BE49-F238E27FC236}">
+                <a16:creationId xmlns:a16="http://schemas.microsoft.com/office/drawing/2014/main" id="{9537FB81-6C84-2C4B-98D8-4AAE55F72074}"/>
+              </a:ext>
+            </a:extLst>
+          </p:cNvPr>
           <p:cNvSpPr>
             <a:spLocks noGrp="1"/>
           </p:cNvSpPr>
@@ -7559,69 +5155,112 @@
           <a:p>
             <a:r>
               <a:rPr lang="en-US" dirty="0"/>
-              <a:t>3. </a:t>
-            </a:r>
+              <a:t>6. Dealing with classes</a:t>
+            </a:r>
+          </a:p>
+        </p:txBody>
+      </p:sp>
+      <p:sp>
+        <p:nvSpPr>
+          <p:cNvPr id="3" name="Content Placeholder 2">
+            <a:extLst>
+              <a:ext uri="{FF2B5EF4-FFF2-40B4-BE49-F238E27FC236}">
+                <a16:creationId xmlns:a16="http://schemas.microsoft.com/office/drawing/2014/main" id="{57C475CE-9A92-CD4F-955A-E2FF25D6D84B}"/>
+              </a:ext>
+            </a:extLst>
+          </p:cNvPr>
+          <p:cNvSpPr>
+            <a:spLocks noGrp="1"/>
+          </p:cNvSpPr>
+          <p:nvPr>
+            <p:ph idx="1"/>
+          </p:nvPr>
+        </p:nvSpPr>
+        <p:spPr/>
+        <p:txBody>
+          <a:bodyPr/>
+          <a:lstStyle/>
+          <a:p>
+            <a:r>
+              <a:rPr lang="en-US" dirty="0"/>
+              <a:t>Factors are commonly used in ecology/evolution</a:t>
+            </a:r>
+          </a:p>
+          <a:p>
+            <a:pPr lvl="1"/>
+            <a:endParaRPr lang="en-US" dirty="0"/>
+          </a:p>
+          <a:p>
+            <a:r>
+              <a:rPr lang="en-US" dirty="0"/>
+              <a:t>If a column is not in the correct class, change it using</a:t>
+            </a:r>
+          </a:p>
+          <a:p>
+            <a:pPr lvl="1"/>
             <a:r>
               <a:rPr lang="en-US" dirty="0" err="1"/>
-              <a:t>Styleguide</a:t>
-            </a:r>
-            <a:r>
-              <a:rPr lang="en-US" dirty="0"/>
-              <a:t>: Filenames</a:t>
-            </a:r>
-          </a:p>
-        </p:txBody>
-      </p:sp>
-      <p:sp>
-        <p:nvSpPr>
-          <p:cNvPr id="3" name="Content Placeholder 2"/>
-          <p:cNvSpPr>
-            <a:spLocks noGrp="1"/>
-          </p:cNvSpPr>
-          <p:nvPr>
-            <p:ph idx="1"/>
-          </p:nvPr>
-        </p:nvSpPr>
-        <p:spPr/>
-        <p:txBody>
-          <a:bodyPr/>
-          <a:lstStyle/>
-          <a:p>
-            <a:r>
-              <a:rPr lang="en-US" dirty="0"/>
-              <a:t>Make meaningful filenames</a:t>
-            </a:r>
-          </a:p>
-          <a:p>
-            <a:r>
-              <a:rPr lang="en-US" dirty="0"/>
-              <a:t>Use _ to separate words</a:t>
-            </a:r>
-          </a:p>
-          <a:p>
-            <a:r>
-              <a:rPr lang="en-US" dirty="0"/>
-              <a:t>Do not use spaces or special characters (only #’s, letters, -, and _). </a:t>
-            </a:r>
-          </a:p>
-          <a:p>
-            <a:r>
-              <a:rPr lang="en-US" dirty="0"/>
-              <a:t>Lower-case not capitalized</a:t>
-            </a:r>
-          </a:p>
-          <a:p>
-            <a:r>
-              <a:rPr lang="en-US" dirty="0"/>
-              <a:t>If need to be run in a particular order, name them starting with 01, 02, 03 etc. </a:t>
-            </a:r>
+              <a:t>as.character</a:t>
+            </a:r>
+            <a:r>
+              <a:rPr lang="en-US" dirty="0"/>
+              <a:t>()</a:t>
+            </a:r>
+          </a:p>
+          <a:p>
+            <a:pPr lvl="1"/>
+            <a:r>
+              <a:rPr lang="en-US" dirty="0" err="1"/>
+              <a:t>as.factor</a:t>
+            </a:r>
+            <a:r>
+              <a:rPr lang="en-US" dirty="0"/>
+              <a:t>()</a:t>
+            </a:r>
+          </a:p>
+          <a:p>
+            <a:pPr lvl="1"/>
+            <a:r>
+              <a:rPr lang="en-US" dirty="0" err="1"/>
+              <a:t>as.numeric</a:t>
+            </a:r>
+            <a:r>
+              <a:rPr lang="en-US" dirty="0"/>
+              <a:t>()</a:t>
+            </a:r>
+          </a:p>
+          <a:p>
+            <a:pPr lvl="1"/>
+            <a:r>
+              <a:rPr lang="en-US" dirty="0" err="1"/>
+              <a:t>as.integer</a:t>
+            </a:r>
+            <a:r>
+              <a:rPr lang="en-US" dirty="0"/>
+              <a:t>() </a:t>
+            </a:r>
+          </a:p>
+          <a:p>
+            <a:pPr lvl="1"/>
+            <a:r>
+              <a:rPr lang="en-US" dirty="0" err="1"/>
+              <a:t>Etc</a:t>
+            </a:r>
+            <a:r>
+              <a:rPr lang="en-US" dirty="0"/>
+              <a:t>…</a:t>
+            </a:r>
+          </a:p>
+          <a:p>
+            <a:pPr lvl="1"/>
+            <a:endParaRPr lang="en-US" dirty="0"/>
           </a:p>
         </p:txBody>
       </p:sp>
     </p:spTree>
     <p:extLst>
       <p:ext uri="{BB962C8B-B14F-4D97-AF65-F5344CB8AC3E}">
-        <p14:creationId xmlns:p14="http://schemas.microsoft.com/office/powerpoint/2010/main" val="3609313730"/>
+        <p14:creationId xmlns:p14="http://schemas.microsoft.com/office/powerpoint/2010/main" val="601597310"/>
       </p:ext>
     </p:extLst>
   </p:cSld>

</xml_diff>